<commit_message>
Update slide last page for 2024 course
</commit_message>
<xml_diff>
--- a/presentation/slides.pptx
+++ b/presentation/slides.pptx
@@ -2,29 +2,29 @@
 <file path=ppt/presentation.xml><?xml version="1.0" encoding="utf-8"?>
 <p:presentation xmlns:a="http://schemas.openxmlformats.org/drawingml/2006/main" xmlns:r="http://schemas.openxmlformats.org/officeDocument/2006/relationships" xmlns:p="http://schemas.openxmlformats.org/presentationml/2006/main" saveSubsetFonts="1">
   <p:sldMasterIdLst>
-    <p:sldMasterId id="2147483720" r:id="rId1"/>
-    <p:sldMasterId id="2147483730" r:id="rId2"/>
+    <p:sldMasterId id="2147483720" r:id="rId3"/>
+    <p:sldMasterId id="2147483730" r:id="rId4"/>
   </p:sldMasterIdLst>
   <p:notesMasterIdLst>
-    <p:notesMasterId r:id="rId16"/>
+    <p:notesMasterId r:id="rId18"/>
   </p:notesMasterIdLst>
   <p:handoutMasterIdLst>
-    <p:handoutMasterId r:id="rId17"/>
+    <p:handoutMasterId r:id="rId19"/>
   </p:handoutMasterIdLst>
   <p:sldIdLst>
-    <p:sldId id="282" r:id="rId3"/>
-    <p:sldId id="289" r:id="rId4"/>
-    <p:sldId id="285" r:id="rId5"/>
-    <p:sldId id="296" r:id="rId6"/>
-    <p:sldId id="291" r:id="rId7"/>
-    <p:sldId id="292" r:id="rId8"/>
-    <p:sldId id="293" r:id="rId9"/>
-    <p:sldId id="294" r:id="rId10"/>
-    <p:sldId id="297" r:id="rId11"/>
-    <p:sldId id="298" r:id="rId12"/>
-    <p:sldId id="299" r:id="rId13"/>
-    <p:sldId id="300" r:id="rId14"/>
-    <p:sldId id="301" r:id="rId15"/>
+    <p:sldId id="282" r:id="rId5"/>
+    <p:sldId id="289" r:id="rId6"/>
+    <p:sldId id="285" r:id="rId7"/>
+    <p:sldId id="296" r:id="rId8"/>
+    <p:sldId id="291" r:id="rId9"/>
+    <p:sldId id="292" r:id="rId10"/>
+    <p:sldId id="293" r:id="rId11"/>
+    <p:sldId id="294" r:id="rId12"/>
+    <p:sldId id="297" r:id="rId13"/>
+    <p:sldId id="298" r:id="rId14"/>
+    <p:sldId id="299" r:id="rId15"/>
+    <p:sldId id="300" r:id="rId16"/>
+    <p:sldId id="301" r:id="rId17"/>
   </p:sldIdLst>
   <p:sldSz cx="12192000" cy="6858000"/>
   <p:notesSz cx="6858000" cy="9144000"/>
@@ -166,14 +166,6 @@
     </p:extLst>
   </p:cmAuthor>
 </p:cmAuthorLst>
-</file>
-
-<file path=ppt/revisionInfo.xml><?xml version="1.0" encoding="utf-8"?>
-<p1510:revInfo xmlns:a="http://schemas.openxmlformats.org/drawingml/2006/main" xmlns:r="http://schemas.openxmlformats.org/officeDocument/2006/relationships" xmlns:p1510="http://schemas.microsoft.com/office/powerpoint/2015/10/main">
-  <p1510:revLst>
-    <p1510:client id="{A9C715DB-1EBC-4EDC-8EF2-5C81401341D9}" v="29" dt="2022-09-27T14:31:28.109"/>
-  </p1510:revLst>
-</p1510:revInfo>
 </file>
 
 <file path=ppt/changesInfos/changesInfo1.xml><?xml version="1.0" encoding="utf-8"?>
@@ -1001,6 +993,345 @@
       </pc:sldChg>
     </pc:docChg>
   </pc:docChgLst>
+  <pc:docChgLst>
+    <pc:chgData name="Emanuele Peschiera" userId="c98f650f-efe2-4127-8fef-fbf5bf9bd19e" providerId="ADAL" clId="{80B85965-00D1-4920-BE66-14615E3F2253}"/>
+    <pc:docChg chg="custSel modSld">
+      <pc:chgData name="Emanuele Peschiera" userId="c98f650f-efe2-4127-8fef-fbf5bf9bd19e" providerId="ADAL" clId="{80B85965-00D1-4920-BE66-14615E3F2253}" dt="2024-03-06T20:25:08.506" v="4" actId="478"/>
+      <pc:docMkLst>
+        <pc:docMk/>
+      </pc:docMkLst>
+      <pc:sldChg chg="delSp mod">
+        <pc:chgData name="Emanuele Peschiera" userId="c98f650f-efe2-4127-8fef-fbf5bf9bd19e" providerId="ADAL" clId="{80B85965-00D1-4920-BE66-14615E3F2253}" dt="2024-03-06T20:24:58.664" v="0" actId="478"/>
+        <pc:sldMkLst>
+          <pc:docMk/>
+          <pc:sldMk cId="2019430980" sldId="297"/>
+        </pc:sldMkLst>
+        <pc:spChg chg="del">
+          <ac:chgData name="Emanuele Peschiera" userId="c98f650f-efe2-4127-8fef-fbf5bf9bd19e" providerId="ADAL" clId="{80B85965-00D1-4920-BE66-14615E3F2253}" dt="2024-03-06T20:24:58.664" v="0" actId="478"/>
+          <ac:spMkLst>
+            <pc:docMk/>
+            <pc:sldMk cId="2019430980" sldId="297"/>
+            <ac:spMk id="3" creationId="{BA3663FC-28FB-1FE2-5B3C-29ADEC13F0AE}"/>
+          </ac:spMkLst>
+        </pc:spChg>
+      </pc:sldChg>
+      <pc:sldChg chg="delSp mod">
+        <pc:chgData name="Emanuele Peschiera" userId="c98f650f-efe2-4127-8fef-fbf5bf9bd19e" providerId="ADAL" clId="{80B85965-00D1-4920-BE66-14615E3F2253}" dt="2024-03-06T20:25:01.282" v="1" actId="478"/>
+        <pc:sldMkLst>
+          <pc:docMk/>
+          <pc:sldMk cId="421692358" sldId="298"/>
+        </pc:sldMkLst>
+        <pc:spChg chg="del">
+          <ac:chgData name="Emanuele Peschiera" userId="c98f650f-efe2-4127-8fef-fbf5bf9bd19e" providerId="ADAL" clId="{80B85965-00D1-4920-BE66-14615E3F2253}" dt="2024-03-06T20:25:01.282" v="1" actId="478"/>
+          <ac:spMkLst>
+            <pc:docMk/>
+            <pc:sldMk cId="421692358" sldId="298"/>
+            <ac:spMk id="3" creationId="{BA3663FC-28FB-1FE2-5B3C-29ADEC13F0AE}"/>
+          </ac:spMkLst>
+        </pc:spChg>
+      </pc:sldChg>
+      <pc:sldChg chg="delSp mod">
+        <pc:chgData name="Emanuele Peschiera" userId="c98f650f-efe2-4127-8fef-fbf5bf9bd19e" providerId="ADAL" clId="{80B85965-00D1-4920-BE66-14615E3F2253}" dt="2024-03-06T20:25:03.473" v="2" actId="478"/>
+        <pc:sldMkLst>
+          <pc:docMk/>
+          <pc:sldMk cId="1861365021" sldId="299"/>
+        </pc:sldMkLst>
+        <pc:spChg chg="del">
+          <ac:chgData name="Emanuele Peschiera" userId="c98f650f-efe2-4127-8fef-fbf5bf9bd19e" providerId="ADAL" clId="{80B85965-00D1-4920-BE66-14615E3F2253}" dt="2024-03-06T20:25:03.473" v="2" actId="478"/>
+          <ac:spMkLst>
+            <pc:docMk/>
+            <pc:sldMk cId="1861365021" sldId="299"/>
+            <ac:spMk id="3" creationId="{BA3663FC-28FB-1FE2-5B3C-29ADEC13F0AE}"/>
+          </ac:spMkLst>
+        </pc:spChg>
+      </pc:sldChg>
+      <pc:sldChg chg="delSp mod">
+        <pc:chgData name="Emanuele Peschiera" userId="c98f650f-efe2-4127-8fef-fbf5bf9bd19e" providerId="ADAL" clId="{80B85965-00D1-4920-BE66-14615E3F2253}" dt="2024-03-06T20:25:05.428" v="3" actId="478"/>
+        <pc:sldMkLst>
+          <pc:docMk/>
+          <pc:sldMk cId="1170055241" sldId="300"/>
+        </pc:sldMkLst>
+        <pc:spChg chg="del">
+          <ac:chgData name="Emanuele Peschiera" userId="c98f650f-efe2-4127-8fef-fbf5bf9bd19e" providerId="ADAL" clId="{80B85965-00D1-4920-BE66-14615E3F2253}" dt="2024-03-06T20:25:05.428" v="3" actId="478"/>
+          <ac:spMkLst>
+            <pc:docMk/>
+            <pc:sldMk cId="1170055241" sldId="300"/>
+            <ac:spMk id="3" creationId="{BA3663FC-28FB-1FE2-5B3C-29ADEC13F0AE}"/>
+          </ac:spMkLst>
+        </pc:spChg>
+      </pc:sldChg>
+      <pc:sldChg chg="delSp mod">
+        <pc:chgData name="Emanuele Peschiera" userId="c98f650f-efe2-4127-8fef-fbf5bf9bd19e" providerId="ADAL" clId="{80B85965-00D1-4920-BE66-14615E3F2253}" dt="2024-03-06T20:25:08.506" v="4" actId="478"/>
+        <pc:sldMkLst>
+          <pc:docMk/>
+          <pc:sldMk cId="2529858331" sldId="301"/>
+        </pc:sldMkLst>
+        <pc:spChg chg="del">
+          <ac:chgData name="Emanuele Peschiera" userId="c98f650f-efe2-4127-8fef-fbf5bf9bd19e" providerId="ADAL" clId="{80B85965-00D1-4920-BE66-14615E3F2253}" dt="2024-03-06T20:25:08.506" v="4" actId="478"/>
+          <ac:spMkLst>
+            <pc:docMk/>
+            <pc:sldMk cId="2529858331" sldId="301"/>
+            <ac:spMk id="3" creationId="{999491C7-F4A1-76E9-42E1-BB6DCCC47697}"/>
+          </ac:spMkLst>
+        </pc:spChg>
+      </pc:sldChg>
+    </pc:docChg>
+  </pc:docChgLst>
+  <pc:docChgLst>
+    <pc:chgData name="Emanuele Peschiera" userId="c98f650f-efe2-4127-8fef-fbf5bf9bd19e" providerId="ADAL" clId="{A4C5067F-4274-40BE-8355-2CE19AD83627}"/>
+    <pc:docChg chg="undo custSel modSld">
+      <pc:chgData name="Emanuele Peschiera" userId="c98f650f-efe2-4127-8fef-fbf5bf9bd19e" providerId="ADAL" clId="{A4C5067F-4274-40BE-8355-2CE19AD83627}" dt="2024-03-04T15:07:53.292" v="216" actId="1036"/>
+      <pc:docMkLst>
+        <pc:docMk/>
+      </pc:docMkLst>
+      <pc:sldChg chg="modSp mod">
+        <pc:chgData name="Emanuele Peschiera" userId="c98f650f-efe2-4127-8fef-fbf5bf9bd19e" providerId="ADAL" clId="{A4C5067F-4274-40BE-8355-2CE19AD83627}" dt="2024-03-04T15:07:53.292" v="216" actId="1036"/>
+        <pc:sldMkLst>
+          <pc:docMk/>
+          <pc:sldMk cId="3889240153" sldId="282"/>
+        </pc:sldMkLst>
+        <pc:spChg chg="mod">
+          <ac:chgData name="Emanuele Peschiera" userId="c98f650f-efe2-4127-8fef-fbf5bf9bd19e" providerId="ADAL" clId="{A4C5067F-4274-40BE-8355-2CE19AD83627}" dt="2024-03-04T15:07:53.292" v="216" actId="1036"/>
+          <ac:spMkLst>
+            <pc:docMk/>
+            <pc:sldMk cId="3889240153" sldId="282"/>
+            <ac:spMk id="2" creationId="{00000000-0000-0000-0000-000000000000}"/>
+          </ac:spMkLst>
+        </pc:spChg>
+        <pc:spChg chg="mod">
+          <ac:chgData name="Emanuele Peschiera" userId="c98f650f-efe2-4127-8fef-fbf5bf9bd19e" providerId="ADAL" clId="{A4C5067F-4274-40BE-8355-2CE19AD83627}" dt="2024-03-04T15:07:04.993" v="195" actId="20577"/>
+          <ac:spMkLst>
+            <pc:docMk/>
+            <pc:sldMk cId="3889240153" sldId="282"/>
+            <ac:spMk id="3" creationId="{00000000-0000-0000-0000-000000000000}"/>
+          </ac:spMkLst>
+        </pc:spChg>
+      </pc:sldChg>
+      <pc:sldChg chg="addSp delSp modSp mod">
+        <pc:chgData name="Emanuele Peschiera" userId="c98f650f-efe2-4127-8fef-fbf5bf9bd19e" providerId="ADAL" clId="{A4C5067F-4274-40BE-8355-2CE19AD83627}" dt="2024-03-04T14:59:36.112" v="126" actId="1076"/>
+        <pc:sldMkLst>
+          <pc:docMk/>
+          <pc:sldMk cId="2529858331" sldId="301"/>
+        </pc:sldMkLst>
+        <pc:spChg chg="add mod">
+          <ac:chgData name="Emanuele Peschiera" userId="c98f650f-efe2-4127-8fef-fbf5bf9bd19e" providerId="ADAL" clId="{A4C5067F-4274-40BE-8355-2CE19AD83627}" dt="2024-03-04T14:59:30.501" v="125" actId="122"/>
+          <ac:spMkLst>
+            <pc:docMk/>
+            <pc:sldMk cId="2529858331" sldId="301"/>
+            <ac:spMk id="8" creationId="{BF1AC3BE-F77B-2CDF-1C1F-15784ABDE646}"/>
+          </ac:spMkLst>
+        </pc:spChg>
+        <pc:spChg chg="mod">
+          <ac:chgData name="Emanuele Peschiera" userId="c98f650f-efe2-4127-8fef-fbf5bf9bd19e" providerId="ADAL" clId="{A4C5067F-4274-40BE-8355-2CE19AD83627}" dt="2024-03-04T14:59:28.528" v="124" actId="122"/>
+          <ac:spMkLst>
+            <pc:docMk/>
+            <pc:sldMk cId="2529858331" sldId="301"/>
+            <ac:spMk id="9" creationId="{3A30E81A-DA80-4EAB-F9B7-9206EA4163B9}"/>
+          </ac:spMkLst>
+        </pc:spChg>
+        <pc:spChg chg="del">
+          <ac:chgData name="Emanuele Peschiera" userId="c98f650f-efe2-4127-8fef-fbf5bf9bd19e" providerId="ADAL" clId="{A4C5067F-4274-40BE-8355-2CE19AD83627}" dt="2024-03-04T14:57:38.128" v="101" actId="478"/>
+          <ac:spMkLst>
+            <pc:docMk/>
+            <pc:sldMk cId="2529858331" sldId="301"/>
+            <ac:spMk id="10" creationId="{993C3FF0-041F-1631-55DB-E49C8FE62629}"/>
+          </ac:spMkLst>
+        </pc:spChg>
+        <pc:spChg chg="mod">
+          <ac:chgData name="Emanuele Peschiera" userId="c98f650f-efe2-4127-8fef-fbf5bf9bd19e" providerId="ADAL" clId="{A4C5067F-4274-40BE-8355-2CE19AD83627}" dt="2024-03-04T14:59:28.528" v="124" actId="122"/>
+          <ac:spMkLst>
+            <pc:docMk/>
+            <pc:sldMk cId="2529858331" sldId="301"/>
+            <ac:spMk id="13" creationId="{5BA6FFF1-3017-7762-B645-5204C8C39BC6}"/>
+          </ac:spMkLst>
+        </pc:spChg>
+        <pc:spChg chg="mod">
+          <ac:chgData name="Emanuele Peschiera" userId="c98f650f-efe2-4127-8fef-fbf5bf9bd19e" providerId="ADAL" clId="{A4C5067F-4274-40BE-8355-2CE19AD83627}" dt="2024-03-04T14:59:28.528" v="124" actId="122"/>
+          <ac:spMkLst>
+            <pc:docMk/>
+            <pc:sldMk cId="2529858331" sldId="301"/>
+            <ac:spMk id="15" creationId="{B0E6C160-02F2-EFC7-FD9E-994FCF874B8E}"/>
+          </ac:spMkLst>
+        </pc:spChg>
+        <pc:spChg chg="del">
+          <ac:chgData name="Emanuele Peschiera" userId="c98f650f-efe2-4127-8fef-fbf5bf9bd19e" providerId="ADAL" clId="{A4C5067F-4274-40BE-8355-2CE19AD83627}" dt="2024-03-04T14:57:34.392" v="98" actId="478"/>
+          <ac:spMkLst>
+            <pc:docMk/>
+            <pc:sldMk cId="2529858331" sldId="301"/>
+            <ac:spMk id="16" creationId="{4B2D8261-DBA9-14B1-FF41-0074FB4E9387}"/>
+          </ac:spMkLst>
+        </pc:spChg>
+        <pc:spChg chg="del">
+          <ac:chgData name="Emanuele Peschiera" userId="c98f650f-efe2-4127-8fef-fbf5bf9bd19e" providerId="ADAL" clId="{A4C5067F-4274-40BE-8355-2CE19AD83627}" dt="2024-03-04T14:57:34.392" v="98" actId="478"/>
+          <ac:spMkLst>
+            <pc:docMk/>
+            <pc:sldMk cId="2529858331" sldId="301"/>
+            <ac:spMk id="17" creationId="{F96A8CCD-47BC-5E24-8666-3B738EA333BE}"/>
+          </ac:spMkLst>
+        </pc:spChg>
+        <pc:spChg chg="mod">
+          <ac:chgData name="Emanuele Peschiera" userId="c98f650f-efe2-4127-8fef-fbf5bf9bd19e" providerId="ADAL" clId="{A4C5067F-4274-40BE-8355-2CE19AD83627}" dt="2024-03-04T14:59:30.501" v="125" actId="122"/>
+          <ac:spMkLst>
+            <pc:docMk/>
+            <pc:sldMk cId="2529858331" sldId="301"/>
+            <ac:spMk id="20" creationId="{74CA381C-5730-2AB8-6331-84C73FE4225B}"/>
+          </ac:spMkLst>
+        </pc:spChg>
+        <pc:spChg chg="del">
+          <ac:chgData name="Emanuele Peschiera" userId="c98f650f-efe2-4127-8fef-fbf5bf9bd19e" providerId="ADAL" clId="{A4C5067F-4274-40BE-8355-2CE19AD83627}" dt="2024-03-04T14:57:12.900" v="75" actId="478"/>
+          <ac:spMkLst>
+            <pc:docMk/>
+            <pc:sldMk cId="2529858331" sldId="301"/>
+            <ac:spMk id="21" creationId="{FC0371C1-233F-C9E4-B071-793E97E63009}"/>
+          </ac:spMkLst>
+        </pc:spChg>
+        <pc:spChg chg="del">
+          <ac:chgData name="Emanuele Peschiera" userId="c98f650f-efe2-4127-8fef-fbf5bf9bd19e" providerId="ADAL" clId="{A4C5067F-4274-40BE-8355-2CE19AD83627}" dt="2024-03-04T14:57:37.139" v="100" actId="478"/>
+          <ac:spMkLst>
+            <pc:docMk/>
+            <pc:sldMk cId="2529858331" sldId="301"/>
+            <ac:spMk id="22" creationId="{21D0F762-7F2E-9BE8-A181-3351DBE0AEDC}"/>
+          </ac:spMkLst>
+        </pc:spChg>
+        <pc:spChg chg="mod">
+          <ac:chgData name="Emanuele Peschiera" userId="c98f650f-efe2-4127-8fef-fbf5bf9bd19e" providerId="ADAL" clId="{A4C5067F-4274-40BE-8355-2CE19AD83627}" dt="2024-03-04T14:59:28.528" v="124" actId="122"/>
+          <ac:spMkLst>
+            <pc:docMk/>
+            <pc:sldMk cId="2529858331" sldId="301"/>
+            <ac:spMk id="38" creationId="{65921716-A323-1E9D-8D5C-60105685D98A}"/>
+          </ac:spMkLst>
+        </pc:spChg>
+        <pc:spChg chg="del mod">
+          <ac:chgData name="Emanuele Peschiera" userId="c98f650f-efe2-4127-8fef-fbf5bf9bd19e" providerId="ADAL" clId="{A4C5067F-4274-40BE-8355-2CE19AD83627}" dt="2024-03-04T14:55:11.996" v="17" actId="478"/>
+          <ac:spMkLst>
+            <pc:docMk/>
+            <pc:sldMk cId="2529858331" sldId="301"/>
+            <ac:spMk id="40" creationId="{197BAE4A-77B6-5C1B-4F4E-0FD85CFBA031}"/>
+          </ac:spMkLst>
+        </pc:spChg>
+        <pc:spChg chg="del">
+          <ac:chgData name="Emanuele Peschiera" userId="c98f650f-efe2-4127-8fef-fbf5bf9bd19e" providerId="ADAL" clId="{A4C5067F-4274-40BE-8355-2CE19AD83627}" dt="2024-03-04T14:57:46.114" v="104" actId="478"/>
+          <ac:spMkLst>
+            <pc:docMk/>
+            <pc:sldMk cId="2529858331" sldId="301"/>
+            <ac:spMk id="43" creationId="{FCB52EBE-37C6-DDC6-ABE5-4C737DBF3FD9}"/>
+          </ac:spMkLst>
+        </pc:spChg>
+        <pc:grpChg chg="add mod">
+          <ac:chgData name="Emanuele Peschiera" userId="c98f650f-efe2-4127-8fef-fbf5bf9bd19e" providerId="ADAL" clId="{A4C5067F-4274-40BE-8355-2CE19AD83627}" dt="2024-03-04T14:59:36.112" v="126" actId="1076"/>
+          <ac:grpSpMkLst>
+            <pc:docMk/>
+            <pc:sldMk cId="2529858331" sldId="301"/>
+            <ac:grpSpMk id="14" creationId="{0F873306-BE4D-7F6F-8F5E-0231E3E1D79C}"/>
+          </ac:grpSpMkLst>
+        </pc:grpChg>
+        <pc:cxnChg chg="add mod">
+          <ac:chgData name="Emanuele Peschiera" userId="c98f650f-efe2-4127-8fef-fbf5bf9bd19e" providerId="ADAL" clId="{A4C5067F-4274-40BE-8355-2CE19AD83627}" dt="2024-03-04T14:59:26.060" v="123" actId="164"/>
+          <ac:cxnSpMkLst>
+            <pc:docMk/>
+            <pc:sldMk cId="2529858331" sldId="301"/>
+            <ac:cxnSpMk id="5" creationId="{8EC9ED70-A2A0-3380-EB6D-A3C544560ACC}"/>
+          </ac:cxnSpMkLst>
+        </pc:cxnChg>
+        <pc:cxnChg chg="add mod">
+          <ac:chgData name="Emanuele Peschiera" userId="c98f650f-efe2-4127-8fef-fbf5bf9bd19e" providerId="ADAL" clId="{A4C5067F-4274-40BE-8355-2CE19AD83627}" dt="2024-03-04T14:59:26.060" v="123" actId="164"/>
+          <ac:cxnSpMkLst>
+            <pc:docMk/>
+            <pc:sldMk cId="2529858331" sldId="301"/>
+            <ac:cxnSpMk id="6" creationId="{60A4F342-2D6C-AEE2-8644-8A267F71341E}"/>
+          </ac:cxnSpMkLst>
+        </pc:cxnChg>
+        <pc:cxnChg chg="add mod">
+          <ac:chgData name="Emanuele Peschiera" userId="c98f650f-efe2-4127-8fef-fbf5bf9bd19e" providerId="ADAL" clId="{A4C5067F-4274-40BE-8355-2CE19AD83627}" dt="2024-03-04T14:59:26.060" v="123" actId="164"/>
+          <ac:cxnSpMkLst>
+            <pc:docMk/>
+            <pc:sldMk cId="2529858331" sldId="301"/>
+            <ac:cxnSpMk id="7" creationId="{DCC82590-FF54-084A-AC5C-8EA9C212BFE3}"/>
+          </ac:cxnSpMkLst>
+        </pc:cxnChg>
+        <pc:cxnChg chg="mod">
+          <ac:chgData name="Emanuele Peschiera" userId="c98f650f-efe2-4127-8fef-fbf5bf9bd19e" providerId="ADAL" clId="{A4C5067F-4274-40BE-8355-2CE19AD83627}" dt="2024-03-04T14:59:26.060" v="123" actId="164"/>
+          <ac:cxnSpMkLst>
+            <pc:docMk/>
+            <pc:sldMk cId="2529858331" sldId="301"/>
+            <ac:cxnSpMk id="12" creationId="{05EF5605-5F50-B26E-C586-A912D9C1E1DE}"/>
+          </ac:cxnSpMkLst>
+        </pc:cxnChg>
+        <pc:cxnChg chg="mod">
+          <ac:chgData name="Emanuele Peschiera" userId="c98f650f-efe2-4127-8fef-fbf5bf9bd19e" providerId="ADAL" clId="{A4C5067F-4274-40BE-8355-2CE19AD83627}" dt="2024-03-04T14:59:26.060" v="123" actId="164"/>
+          <ac:cxnSpMkLst>
+            <pc:docMk/>
+            <pc:sldMk cId="2529858331" sldId="301"/>
+            <ac:cxnSpMk id="24" creationId="{BC1922FC-0B94-1EA6-2F14-6EB70FD0C5DF}"/>
+          </ac:cxnSpMkLst>
+        </pc:cxnChg>
+        <pc:cxnChg chg="mod">
+          <ac:chgData name="Emanuele Peschiera" userId="c98f650f-efe2-4127-8fef-fbf5bf9bd19e" providerId="ADAL" clId="{A4C5067F-4274-40BE-8355-2CE19AD83627}" dt="2024-03-04T14:59:26.060" v="123" actId="164"/>
+          <ac:cxnSpMkLst>
+            <pc:docMk/>
+            <pc:sldMk cId="2529858331" sldId="301"/>
+            <ac:cxnSpMk id="25" creationId="{1588CA34-02FF-A9B8-AE11-0213CCC2E266}"/>
+          </ac:cxnSpMkLst>
+        </pc:cxnChg>
+        <pc:cxnChg chg="del">
+          <ac:chgData name="Emanuele Peschiera" userId="c98f650f-efe2-4127-8fef-fbf5bf9bd19e" providerId="ADAL" clId="{A4C5067F-4274-40BE-8355-2CE19AD83627}" dt="2024-03-04T14:57:11.609" v="74" actId="478"/>
+          <ac:cxnSpMkLst>
+            <pc:docMk/>
+            <pc:sldMk cId="2529858331" sldId="301"/>
+            <ac:cxnSpMk id="28" creationId="{6DB465E5-EF14-C26D-D8C0-7EFF9700D6C8}"/>
+          </ac:cxnSpMkLst>
+        </pc:cxnChg>
+        <pc:cxnChg chg="del">
+          <ac:chgData name="Emanuele Peschiera" userId="c98f650f-efe2-4127-8fef-fbf5bf9bd19e" providerId="ADAL" clId="{A4C5067F-4274-40BE-8355-2CE19AD83627}" dt="2024-03-04T14:55:18.482" v="18" actId="478"/>
+          <ac:cxnSpMkLst>
+            <pc:docMk/>
+            <pc:sldMk cId="2529858331" sldId="301"/>
+            <ac:cxnSpMk id="29" creationId="{52709D63-1649-2B7F-7417-C5DF7AF3D27B}"/>
+          </ac:cxnSpMkLst>
+        </pc:cxnChg>
+        <pc:cxnChg chg="del">
+          <ac:chgData name="Emanuele Peschiera" userId="c98f650f-efe2-4127-8fef-fbf5bf9bd19e" providerId="ADAL" clId="{A4C5067F-4274-40BE-8355-2CE19AD83627}" dt="2024-03-04T14:57:35.353" v="99" actId="478"/>
+          <ac:cxnSpMkLst>
+            <pc:docMk/>
+            <pc:sldMk cId="2529858331" sldId="301"/>
+            <ac:cxnSpMk id="33" creationId="{B39AEA4B-B861-636B-3B59-34E49D164002}"/>
+          </ac:cxnSpMkLst>
+        </pc:cxnChg>
+        <pc:cxnChg chg="del">
+          <ac:chgData name="Emanuele Peschiera" userId="c98f650f-efe2-4127-8fef-fbf5bf9bd19e" providerId="ADAL" clId="{A4C5067F-4274-40BE-8355-2CE19AD83627}" dt="2024-03-04T14:57:34.392" v="98" actId="478"/>
+          <ac:cxnSpMkLst>
+            <pc:docMk/>
+            <pc:sldMk cId="2529858331" sldId="301"/>
+            <ac:cxnSpMk id="35" creationId="{A1FD05DD-7989-34FF-FB8C-5B832E79BE14}"/>
+          </ac:cxnSpMkLst>
+        </pc:cxnChg>
+        <pc:cxnChg chg="mod">
+          <ac:chgData name="Emanuele Peschiera" userId="c98f650f-efe2-4127-8fef-fbf5bf9bd19e" providerId="ADAL" clId="{A4C5067F-4274-40BE-8355-2CE19AD83627}" dt="2024-03-04T14:59:26.060" v="123" actId="164"/>
+          <ac:cxnSpMkLst>
+            <pc:docMk/>
+            <pc:sldMk cId="2529858331" sldId="301"/>
+            <ac:cxnSpMk id="37" creationId="{4BB8B9ED-873B-F033-92C1-7D9AD8ADE83D}"/>
+          </ac:cxnSpMkLst>
+        </pc:cxnChg>
+        <pc:cxnChg chg="del">
+          <ac:chgData name="Emanuele Peschiera" userId="c98f650f-efe2-4127-8fef-fbf5bf9bd19e" providerId="ADAL" clId="{A4C5067F-4274-40BE-8355-2CE19AD83627}" dt="2024-03-04T14:57:39.083" v="102" actId="478"/>
+          <ac:cxnSpMkLst>
+            <pc:docMk/>
+            <pc:sldMk cId="2529858331" sldId="301"/>
+            <ac:cxnSpMk id="39" creationId="{458C34B2-8DDA-9046-536C-10209C88E1AC}"/>
+          </ac:cxnSpMkLst>
+        </pc:cxnChg>
+        <pc:cxnChg chg="del">
+          <ac:chgData name="Emanuele Peschiera" userId="c98f650f-efe2-4127-8fef-fbf5bf9bd19e" providerId="ADAL" clId="{A4C5067F-4274-40BE-8355-2CE19AD83627}" dt="2024-03-04T14:57:34.392" v="98" actId="478"/>
+          <ac:cxnSpMkLst>
+            <pc:docMk/>
+            <pc:sldMk cId="2529858331" sldId="301"/>
+            <ac:cxnSpMk id="42" creationId="{6EBBE4B2-6A10-0ACD-0025-B78D2475B984}"/>
+          </ac:cxnSpMkLst>
+        </pc:cxnChg>
+      </pc:sldChg>
+    </pc:docChg>
+  </pc:docChgLst>
 </pc:chgInfo>
 </file>
 
@@ -1093,7 +1424,7 @@
                 <a:cs typeface="Arial" pitchFamily="34" charset="0"/>
               </a:rPr>
               <a:pPr/>
-              <a:t>27/09/2022</a:t>
+              <a:t>6/03/2024</a:t>
             </a:fld>
             <a:endParaRPr lang="nl-BE" sz="1000">
               <a:latin typeface="Arial" pitchFamily="34" charset="0"/>
@@ -1272,7 +1603,7 @@
             <a:fld id="{7AF0A2F9-EF49-41B3-9E69-7CDBDC14786A}" type="datetimeFigureOut">
               <a:rPr lang="nl-BE" smtClean="0"/>
               <a:pPr/>
-              <a:t>27/09/2022</a:t>
+              <a:t>6/03/2024</a:t>
             </a:fld>
             <a:endParaRPr lang="nl-BE"/>
           </a:p>
@@ -2544,7 +2875,7 @@
           <a:p>
             <a:fld id="{A25A1E03-75DD-4733-9EB7-E1B21C513EDE}" type="datetime1">
               <a:rPr lang="nl-BE" smtClean="0"/>
-              <a:t>27/09/2022</a:t>
+              <a:t>6/03/2024</a:t>
             </a:fld>
             <a:endParaRPr lang="nl-BE" dirty="0"/>
           </a:p>
@@ -3213,7 +3544,7 @@
           <a:p>
             <a:fld id="{3B2D1818-9582-4953-B1EE-38B8195A306A}" type="datetime1">
               <a:rPr lang="nl-BE" smtClean="0"/>
-              <a:t>27/09/2022</a:t>
+              <a:t>6/03/2024</a:t>
             </a:fld>
             <a:endParaRPr lang="nl-BE"/>
           </a:p>
@@ -3644,7 +3975,7 @@
           <a:p>
             <a:fld id="{53A16DF1-98C7-44EB-A81C-DD6332C3D0D0}" type="datetime1">
               <a:rPr lang="nl-BE" smtClean="0"/>
-              <a:t>27/09/2022</a:t>
+              <a:t>6/03/2024</a:t>
             </a:fld>
             <a:endParaRPr lang="nl-BE"/>
           </a:p>
@@ -3767,7 +4098,7 @@
           <a:p>
             <a:fld id="{E74E6699-E900-4833-A806-8DC10C961E35}" type="datetime1">
               <a:rPr lang="nl-BE" smtClean="0"/>
-              <a:t>27/09/2022</a:t>
+              <a:t>6/03/2024</a:t>
             </a:fld>
             <a:endParaRPr lang="nl-BE"/>
           </a:p>
@@ -3863,7 +4194,7 @@
           <a:p>
             <a:fld id="{EE9D4C1C-14AC-42EC-86A4-1A1F1C8665A0}" type="datetime1">
               <a:rPr lang="nl-BE" smtClean="0"/>
-              <a:t>27/09/2022</a:t>
+              <a:t>6/03/2024</a:t>
             </a:fld>
             <a:endParaRPr lang="nl-BE"/>
           </a:p>
@@ -4148,7 +4479,7 @@
           <a:p>
             <a:fld id="{841AD2C4-6CDA-4BAF-BCA5-159D526DA322}" type="datetime1">
               <a:rPr lang="nl-BE" smtClean="0"/>
-              <a:t>27/09/2022</a:t>
+              <a:t>6/03/2024</a:t>
             </a:fld>
             <a:endParaRPr lang="nl-BE"/>
           </a:p>
@@ -4461,7 +4792,7 @@
           <a:p>
             <a:fld id="{C099C56F-7887-4E01-83A4-B62C704AF368}" type="datetime1">
               <a:rPr lang="nl-BE" smtClean="0"/>
-              <a:t>27/09/2022</a:t>
+              <a:t>6/03/2024</a:t>
             </a:fld>
             <a:endParaRPr lang="nl-BE" dirty="0"/>
           </a:p>
@@ -4541,7 +4872,7 @@
           <a:p>
             <a:fld id="{D1F088C9-0FC0-440B-8314-5EF9819A24DA}" type="datetime1">
               <a:rPr lang="nl-BE" smtClean="0"/>
-              <a:t>27/09/2022</a:t>
+              <a:t>6/03/2024</a:t>
             </a:fld>
             <a:endParaRPr lang="nl-BE" dirty="0"/>
           </a:p>
@@ -5321,7 +5652,7 @@
           <a:p>
             <a:fld id="{A3DC81F3-DF63-45EB-BC9D-33AF77580B52}" type="datetime1">
               <a:rPr lang="nl-BE" smtClean="0"/>
-              <a:t>27/09/2022</a:t>
+              <a:t>6/03/2024</a:t>
             </a:fld>
             <a:endParaRPr lang="nl-BE"/>
           </a:p>
@@ -5752,7 +6083,7 @@
           <a:p>
             <a:fld id="{06B5AFA0-1713-4D1E-A5CE-7A72D7E34AF2}" type="datetime1">
               <a:rPr lang="nl-BE" smtClean="0"/>
-              <a:t>27/09/2022</a:t>
+              <a:t>6/03/2024</a:t>
             </a:fld>
             <a:endParaRPr lang="nl-BE"/>
           </a:p>
@@ -5875,7 +6206,7 @@
           <a:p>
             <a:fld id="{6AAC73DC-3C0A-4EDD-9DC2-84D707D8214B}" type="datetime1">
               <a:rPr lang="nl-BE" smtClean="0"/>
-              <a:t>27/09/2022</a:t>
+              <a:t>6/03/2024</a:t>
             </a:fld>
             <a:endParaRPr lang="nl-BE"/>
           </a:p>
@@ -5971,7 +6302,7 @@
           <a:p>
             <a:fld id="{E4D22462-08EE-46A5-B614-B58F8B9D7749}" type="datetime1">
               <a:rPr lang="nl-BE" smtClean="0"/>
-              <a:t>27/09/2022</a:t>
+              <a:t>6/03/2024</a:t>
             </a:fld>
             <a:endParaRPr lang="nl-BE"/>
           </a:p>
@@ -6256,7 +6587,7 @@
           <a:p>
             <a:fld id="{612D67E1-890D-490E-BBA5-F7A383241BCC}" type="datetime1">
               <a:rPr lang="nl-BE" smtClean="0"/>
-              <a:t>27/09/2022</a:t>
+              <a:t>6/03/2024</a:t>
             </a:fld>
             <a:endParaRPr lang="nl-BE"/>
           </a:p>
@@ -6521,7 +6852,7 @@
           <a:p>
             <a:fld id="{6535815E-1DF4-4E01-BC2D-31A156755E79}" type="datetime1">
               <a:rPr lang="nl-BE" smtClean="0"/>
-              <a:t>27/09/2022</a:t>
+              <a:t>6/03/2024</a:t>
             </a:fld>
             <a:endParaRPr lang="nl-BE" dirty="0"/>
           </a:p>
@@ -6740,7 +7071,7 @@
           <a:p>
             <a:fld id="{79F43CF7-32C8-44EC-86BF-99A2657BA3D3}" type="datetime1">
               <a:rPr lang="nl-BE" smtClean="0"/>
-              <a:t>27/09/2022</a:t>
+              <a:t>6/03/2024</a:t>
             </a:fld>
             <a:endParaRPr lang="nl-BE" dirty="0"/>
           </a:p>
@@ -7363,7 +7694,7 @@
           <a:p>
             <a:fld id="{FCC81C21-CD04-4C56-8510-F9D751A99BC5}" type="datetime1">
               <a:rPr lang="nl-BE" smtClean="0"/>
-              <a:t>27/09/2022</a:t>
+              <a:t>6/03/2024</a:t>
             </a:fld>
             <a:endParaRPr lang="nl-BE" dirty="0"/>
           </a:p>
@@ -7829,7 +8160,7 @@
         </p:nvSpPr>
         <p:spPr>
           <a:xfrm>
-            <a:off x="2999656" y="2280778"/>
+            <a:off x="2999656" y="2568810"/>
             <a:ext cx="9192343" cy="2516374"/>
           </a:xfrm>
         </p:spPr>
@@ -7843,20 +8174,52 @@
               </a:lnSpc>
             </a:pPr>
             <a:r>
+              <a:rPr lang="nl-NL" sz="4800" dirty="0"/>
+              <a:t>Signaalverwerking en modellering: labosessie</a:t>
+            </a:r>
+            <a:br>
+              <a:rPr lang="en-BE" sz="4800" dirty="0"/>
+            </a:br>
+            <a:r>
               <a:rPr lang="en-BE" sz="4800" dirty="0">
                 <a:latin typeface="Open Sans" panose="020B0606030504020204" pitchFamily="34" charset="0"/>
                 <a:ea typeface="Open Sans" panose="020B0606030504020204" pitchFamily="34" charset="0"/>
                 <a:cs typeface="Open Sans" panose="020B0606030504020204" pitchFamily="34" charset="0"/>
               </a:rPr>
-              <a:t>Communication Networks</a:t>
-            </a:r>
-            <a:br>
-              <a:rPr lang="nl-NL" sz="3200" dirty="0">
+              <a:t> [</a:t>
+            </a:r>
+            <a:r>
+              <a:rPr lang="en-BE" sz="3200" dirty="0">
                 <a:latin typeface="Open Sans" panose="020B0606030504020204" pitchFamily="34" charset="0"/>
                 <a:ea typeface="Open Sans" panose="020B0606030504020204" pitchFamily="34" charset="0"/>
                 <a:cs typeface="Open Sans" panose="020B0606030504020204" pitchFamily="34" charset="0"/>
               </a:rPr>
-            </a:br>
+              <a:t> </a:t>
+            </a:r>
+            <a:r>
+              <a:rPr lang="it-IT" sz="4800" dirty="0">
+                <a:latin typeface="Open Sans" panose="020B0606030504020204" pitchFamily="34" charset="0"/>
+                <a:ea typeface="Open Sans" panose="020B0606030504020204" pitchFamily="34" charset="0"/>
+                <a:cs typeface="Open Sans" panose="020B0606030504020204" pitchFamily="34" charset="0"/>
+              </a:rPr>
+              <a:t>JLI2AB</a:t>
+            </a:r>
+            <a:r>
+              <a:rPr lang="en-BE" sz="1400" dirty="0">
+                <a:latin typeface="Open Sans" panose="020B0606030504020204" pitchFamily="34" charset="0"/>
+                <a:ea typeface="Open Sans" panose="020B0606030504020204" pitchFamily="34" charset="0"/>
+                <a:cs typeface="Open Sans" panose="020B0606030504020204" pitchFamily="34" charset="0"/>
+              </a:rPr>
+              <a:t> </a:t>
+            </a:r>
+            <a:r>
+              <a:rPr lang="en-BE" sz="4800" dirty="0">
+                <a:latin typeface="Open Sans" panose="020B0606030504020204" pitchFamily="34" charset="0"/>
+                <a:ea typeface="Open Sans" panose="020B0606030504020204" pitchFamily="34" charset="0"/>
+                <a:cs typeface="Open Sans" panose="020B0606030504020204" pitchFamily="34" charset="0"/>
+              </a:rPr>
+              <a:t>]</a:t>
+            </a:r>
             <a:endParaRPr lang="en-US" sz="3600" dirty="0">
               <a:solidFill>
                 <a:schemeClr val="accent3">
@@ -7892,6 +8255,17 @@
           <a:lstStyle/>
           <a:p>
             <a:r>
+              <a:rPr lang="en-BE" sz="2000" dirty="0">
+                <a:solidFill>
+                  <a:schemeClr val="accent3">
+                    <a:lumMod val="60000"/>
+                    <a:lumOff val="40000"/>
+                  </a:schemeClr>
+                </a:solidFill>
+              </a:rPr>
+              <a:t>Emanuele Peschiera, Fan Wu</a:t>
+            </a:r>
+            <a:r>
               <a:rPr lang="nl-BE" sz="2000" dirty="0">
                 <a:solidFill>
                   <a:schemeClr val="accent3">
@@ -7900,7 +8274,7 @@
                   </a:schemeClr>
                 </a:solidFill>
               </a:rPr>
-              <a:t>Gilles Callebaut 				</a:t>
+              <a:t>				</a:t>
             </a:r>
             <a:r>
               <a:rPr lang="nl-BE" sz="1600" dirty="0">
@@ -7922,7 +8296,7 @@
                   </a:schemeClr>
                 </a:solidFill>
               </a:rPr>
-              <a:t>27</a:t>
+              <a:t>07</a:t>
             </a:r>
             <a:r>
               <a:rPr lang="nl-BE" sz="1600" dirty="0">
@@ -7944,7 +8318,7 @@
                   </a:schemeClr>
                 </a:solidFill>
               </a:rPr>
-              <a:t>9</a:t>
+              <a:t>3</a:t>
             </a:r>
             <a:r>
               <a:rPr lang="nl-BE" sz="1600" dirty="0">
@@ -7966,7 +8340,7 @@
                   </a:schemeClr>
                 </a:solidFill>
               </a:rPr>
-              <a:t>22</a:t>
+              <a:t>24</a:t>
             </a:r>
             <a:endParaRPr lang="nl-BE" sz="1600" dirty="0">
               <a:solidFill>
@@ -8037,35 +8411,6 @@
               <a:rPr lang="en-BE" dirty="0"/>
               <a:t>Layer 2 versus layer 3</a:t>
             </a:r>
-          </a:p>
-        </p:txBody>
-      </p:sp>
-      <p:sp>
-        <p:nvSpPr>
-          <p:cNvPr id="3" name="Date Placeholder 2">
-            <a:extLst>
-              <a:ext uri="{FF2B5EF4-FFF2-40B4-BE49-F238E27FC236}">
-                <a16:creationId xmlns:a16="http://schemas.microsoft.com/office/drawing/2014/main" id="{BA3663FC-28FB-1FE2-5B3C-29ADEC13F0AE}"/>
-              </a:ext>
-            </a:extLst>
-          </p:cNvPr>
-          <p:cNvSpPr>
-            <a:spLocks noGrp="1"/>
-          </p:cNvSpPr>
-          <p:nvPr>
-            <p:ph type="dt" sz="half" idx="10"/>
-          </p:nvPr>
-        </p:nvSpPr>
-        <p:spPr/>
-        <p:txBody>
-          <a:bodyPr/>
-          <a:lstStyle/>
-          <a:p>
-            <a:fld id="{D1F088C9-0FC0-440B-8314-5EF9819A24DA}" type="datetime1">
-              <a:rPr lang="nl-BE" smtClean="0"/>
-              <a:t>27/09/2022</a:t>
-            </a:fld>
-            <a:endParaRPr lang="nl-BE" dirty="0"/>
           </a:p>
         </p:txBody>
       </p:sp>
@@ -8927,35 +9272,6 @@
       </p:sp>
       <p:sp>
         <p:nvSpPr>
-          <p:cNvPr id="3" name="Date Placeholder 2">
-            <a:extLst>
-              <a:ext uri="{FF2B5EF4-FFF2-40B4-BE49-F238E27FC236}">
-                <a16:creationId xmlns:a16="http://schemas.microsoft.com/office/drawing/2014/main" id="{BA3663FC-28FB-1FE2-5B3C-29ADEC13F0AE}"/>
-              </a:ext>
-            </a:extLst>
-          </p:cNvPr>
-          <p:cNvSpPr>
-            <a:spLocks noGrp="1"/>
-          </p:cNvSpPr>
-          <p:nvPr>
-            <p:ph type="dt" sz="half" idx="10"/>
-          </p:nvPr>
-        </p:nvSpPr>
-        <p:spPr/>
-        <p:txBody>
-          <a:bodyPr/>
-          <a:lstStyle/>
-          <a:p>
-            <a:fld id="{D1F088C9-0FC0-440B-8314-5EF9819A24DA}" type="datetime1">
-              <a:rPr lang="nl-BE" smtClean="0"/>
-              <a:t>27/09/2022</a:t>
-            </a:fld>
-            <a:endParaRPr lang="nl-BE" dirty="0"/>
-          </a:p>
-        </p:txBody>
-      </p:sp>
-      <p:sp>
-        <p:nvSpPr>
           <p:cNvPr id="4" name="Slide Number Placeholder 3">
             <a:extLst>
               <a:ext uri="{FF2B5EF4-FFF2-40B4-BE49-F238E27FC236}">
@@ -9814,35 +10130,6 @@
       </p:sp>
       <p:sp>
         <p:nvSpPr>
-          <p:cNvPr id="3" name="Date Placeholder 2">
-            <a:extLst>
-              <a:ext uri="{FF2B5EF4-FFF2-40B4-BE49-F238E27FC236}">
-                <a16:creationId xmlns:a16="http://schemas.microsoft.com/office/drawing/2014/main" id="{BA3663FC-28FB-1FE2-5B3C-29ADEC13F0AE}"/>
-              </a:ext>
-            </a:extLst>
-          </p:cNvPr>
-          <p:cNvSpPr>
-            <a:spLocks noGrp="1"/>
-          </p:cNvSpPr>
-          <p:nvPr>
-            <p:ph type="dt" sz="half" idx="10"/>
-          </p:nvPr>
-        </p:nvSpPr>
-        <p:spPr/>
-        <p:txBody>
-          <a:bodyPr/>
-          <a:lstStyle/>
-          <a:p>
-            <a:fld id="{D1F088C9-0FC0-440B-8314-5EF9819A24DA}" type="datetime1">
-              <a:rPr lang="nl-BE" smtClean="0"/>
-              <a:t>27/09/2022</a:t>
-            </a:fld>
-            <a:endParaRPr lang="nl-BE" dirty="0"/>
-          </a:p>
-        </p:txBody>
-      </p:sp>
-      <p:sp>
-        <p:nvSpPr>
           <p:cNvPr id="4" name="Slide Number Placeholder 3">
             <a:extLst>
               <a:ext uri="{FF2B5EF4-FFF2-40B4-BE49-F238E27FC236}">
@@ -10714,51 +11001,6 @@
           <a:chExt cx="0" cy="0"/>
         </a:xfrm>
       </p:grpSpPr>
-      <p:cxnSp>
-        <p:nvCxnSpPr>
-          <p:cNvPr id="12" name="Straight Connector 11">
-            <a:extLst>
-              <a:ext uri="{FF2B5EF4-FFF2-40B4-BE49-F238E27FC236}">
-                <a16:creationId xmlns:a16="http://schemas.microsoft.com/office/drawing/2014/main" id="{05EF5605-5F50-B26E-C586-A912D9C1E1DE}"/>
-              </a:ext>
-            </a:extLst>
-          </p:cNvPr>
-          <p:cNvCxnSpPr>
-            <a:cxnSpLocks/>
-          </p:cNvCxnSpPr>
-          <p:nvPr/>
-        </p:nvCxnSpPr>
-        <p:spPr>
-          <a:xfrm>
-            <a:off x="2637084" y="3152549"/>
-            <a:ext cx="6768752" cy="0"/>
-          </a:xfrm>
-          <a:prstGeom prst="line">
-            <a:avLst/>
-          </a:prstGeom>
-          <a:ln>
-            <a:solidFill>
-              <a:schemeClr val="bg1">
-                <a:lumMod val="75000"/>
-              </a:schemeClr>
-            </a:solidFill>
-          </a:ln>
-        </p:spPr>
-        <p:style>
-          <a:lnRef idx="1">
-            <a:schemeClr val="accent1"/>
-          </a:lnRef>
-          <a:fillRef idx="0">
-            <a:schemeClr val="accent1"/>
-          </a:fillRef>
-          <a:effectRef idx="0">
-            <a:schemeClr val="accent1"/>
-          </a:effectRef>
-          <a:fontRef idx="minor">
-            <a:schemeClr val="tx1"/>
-          </a:fontRef>
-        </p:style>
-      </p:cxnSp>
       <p:sp>
         <p:nvSpPr>
           <p:cNvPr id="2" name="Title 1">
@@ -10789,35 +11031,6 @@
       </p:sp>
       <p:sp>
         <p:nvSpPr>
-          <p:cNvPr id="3" name="Date Placeholder 2">
-            <a:extLst>
-              <a:ext uri="{FF2B5EF4-FFF2-40B4-BE49-F238E27FC236}">
-                <a16:creationId xmlns:a16="http://schemas.microsoft.com/office/drawing/2014/main" id="{999491C7-F4A1-76E9-42E1-BB6DCCC47697}"/>
-              </a:ext>
-            </a:extLst>
-          </p:cNvPr>
-          <p:cNvSpPr>
-            <a:spLocks noGrp="1"/>
-          </p:cNvSpPr>
-          <p:nvPr>
-            <p:ph type="dt" sz="half" idx="10"/>
-          </p:nvPr>
-        </p:nvSpPr>
-        <p:spPr/>
-        <p:txBody>
-          <a:bodyPr/>
-          <a:lstStyle/>
-          <a:p>
-            <a:fld id="{D1F088C9-0FC0-440B-8314-5EF9819A24DA}" type="datetime1">
-              <a:rPr lang="nl-BE" smtClean="0"/>
-              <a:t>27/09/2022</a:t>
-            </a:fld>
-            <a:endParaRPr lang="nl-BE" dirty="0"/>
-          </a:p>
-        </p:txBody>
-      </p:sp>
-      <p:sp>
-        <p:nvSpPr>
           <p:cNvPr id="4" name="Slide Number Placeholder 3">
             <a:extLst>
               <a:ext uri="{FF2B5EF4-FFF2-40B4-BE49-F238E27FC236}">
@@ -10846,991 +11059,630 @@
           </a:p>
         </p:txBody>
       </p:sp>
-      <p:sp>
-        <p:nvSpPr>
-          <p:cNvPr id="9" name="Oval 8">
+      <p:grpSp>
+        <p:nvGrpSpPr>
+          <p:cNvPr id="14" name="Group 13">
             <a:extLst>
               <a:ext uri="{FF2B5EF4-FFF2-40B4-BE49-F238E27FC236}">
-                <a16:creationId xmlns:a16="http://schemas.microsoft.com/office/drawing/2014/main" id="{3A30E81A-DA80-4EAB-F9B7-9206EA4163B9}"/>
+                <a16:creationId xmlns:a16="http://schemas.microsoft.com/office/drawing/2014/main" id="{0F873306-BE4D-7F6F-8F5E-0231E3E1D79C}"/>
               </a:ext>
             </a:extLst>
           </p:cNvPr>
-          <p:cNvSpPr/>
+          <p:cNvGrpSpPr/>
           <p:nvPr/>
-        </p:nvSpPr>
-        <p:spPr>
-          <a:xfrm>
-            <a:off x="4059850" y="3008533"/>
-            <a:ext cx="288032" cy="288032"/>
-          </a:xfrm>
-          <a:prstGeom prst="ellipse">
-            <a:avLst/>
-          </a:prstGeom>
-          <a:solidFill>
-            <a:srgbClr val="65318F"/>
-          </a:solidFill>
-          <a:ln>
+        </p:nvGrpSpPr>
+        <p:grpSpPr>
+          <a:xfrm>
+            <a:off x="4040422" y="2411647"/>
+            <a:ext cx="5447858" cy="2034706"/>
+            <a:chOff x="3384446" y="2186382"/>
+            <a:chExt cx="5447858" cy="2034706"/>
+          </a:xfrm>
+        </p:grpSpPr>
+        <p:cxnSp>
+          <p:nvCxnSpPr>
+            <p:cNvPr id="12" name="Straight Connector 11">
+              <a:extLst>
+                <a:ext uri="{FF2B5EF4-FFF2-40B4-BE49-F238E27FC236}">
+                  <a16:creationId xmlns:a16="http://schemas.microsoft.com/office/drawing/2014/main" id="{05EF5605-5F50-B26E-C586-A912D9C1E1DE}"/>
+                </a:ext>
+              </a:extLst>
+            </p:cNvPr>
+            <p:cNvCxnSpPr>
+              <a:cxnSpLocks/>
+            </p:cNvCxnSpPr>
+            <p:nvPr/>
+          </p:nvCxnSpPr>
+          <p:spPr>
+            <a:xfrm>
+              <a:off x="3784910" y="3278083"/>
+              <a:ext cx="3170884" cy="0"/>
+            </a:xfrm>
+            <a:prstGeom prst="line">
+              <a:avLst/>
+            </a:prstGeom>
+            <a:ln>
+              <a:solidFill>
+                <a:schemeClr val="bg1">
+                  <a:lumMod val="75000"/>
+                </a:schemeClr>
+              </a:solidFill>
+            </a:ln>
+          </p:spPr>
+          <p:style>
+            <a:lnRef idx="1">
+              <a:schemeClr val="accent1"/>
+            </a:lnRef>
+            <a:fillRef idx="0">
+              <a:schemeClr val="accent1"/>
+            </a:fillRef>
+            <a:effectRef idx="0">
+              <a:schemeClr val="accent1"/>
+            </a:effectRef>
+            <a:fontRef idx="minor">
+              <a:schemeClr val="tx1"/>
+            </a:fontRef>
+          </p:style>
+        </p:cxnSp>
+        <p:sp>
+          <p:nvSpPr>
+            <p:cNvPr id="9" name="Oval 8">
+              <a:extLst>
+                <a:ext uri="{FF2B5EF4-FFF2-40B4-BE49-F238E27FC236}">
+                  <a16:creationId xmlns:a16="http://schemas.microsoft.com/office/drawing/2014/main" id="{3A30E81A-DA80-4EAB-F9B7-9206EA4163B9}"/>
+                </a:ext>
+              </a:extLst>
+            </p:cNvPr>
+            <p:cNvSpPr/>
+            <p:nvPr/>
+          </p:nvSpPr>
+          <p:spPr>
+            <a:xfrm>
+              <a:off x="5207676" y="3134067"/>
+              <a:ext cx="288032" cy="288032"/>
+            </a:xfrm>
+            <a:prstGeom prst="ellipse">
+              <a:avLst/>
+            </a:prstGeom>
+            <a:solidFill>
+              <a:srgbClr val="65318F"/>
+            </a:solidFill>
+            <a:ln>
+              <a:noFill/>
+            </a:ln>
+          </p:spPr>
+          <p:style>
+            <a:lnRef idx="2">
+              <a:schemeClr val="accent1">
+                <a:shade val="50000"/>
+              </a:schemeClr>
+            </a:lnRef>
+            <a:fillRef idx="1">
+              <a:schemeClr val="accent1"/>
+            </a:fillRef>
+            <a:effectRef idx="0">
+              <a:schemeClr val="accent1"/>
+            </a:effectRef>
+            <a:fontRef idx="minor">
+              <a:schemeClr val="lt1"/>
+            </a:fontRef>
+          </p:style>
+          <p:txBody>
+            <a:bodyPr rtlCol="0" anchor="ctr"/>
+            <a:lstStyle/>
+            <a:p>
+              <a:pPr algn="ctr"/>
+              <a:r>
+                <a:rPr lang="en-BE" dirty="0">
+                  <a:latin typeface="Open Sans" panose="020B0606030504020204" pitchFamily="34" charset="0"/>
+                  <a:ea typeface="Open Sans" panose="020B0606030504020204" pitchFamily="34" charset="0"/>
+                  <a:cs typeface="Open Sans" panose="020B0606030504020204" pitchFamily="34" charset="0"/>
+                </a:rPr>
+                <a:t>2</a:t>
+              </a:r>
+            </a:p>
+          </p:txBody>
+        </p:sp>
+        <p:sp>
+          <p:nvSpPr>
+            <p:cNvPr id="13" name="Oval 12">
+              <a:extLst>
+                <a:ext uri="{FF2B5EF4-FFF2-40B4-BE49-F238E27FC236}">
+                  <a16:creationId xmlns:a16="http://schemas.microsoft.com/office/drawing/2014/main" id="{5BA6FFF1-3017-7762-B645-5204C8C39BC6}"/>
+                </a:ext>
+              </a:extLst>
+            </p:cNvPr>
+            <p:cNvSpPr/>
+            <p:nvPr/>
+          </p:nvSpPr>
+          <p:spPr>
+            <a:xfrm>
+              <a:off x="4026918" y="3134067"/>
+              <a:ext cx="288032" cy="288032"/>
+            </a:xfrm>
+            <a:prstGeom prst="ellipse">
+              <a:avLst/>
+            </a:prstGeom>
+            <a:solidFill>
+              <a:schemeClr val="tx2"/>
+            </a:solidFill>
+            <a:ln>
+              <a:noFill/>
+            </a:ln>
+          </p:spPr>
+          <p:style>
+            <a:lnRef idx="2">
+              <a:schemeClr val="accent1">
+                <a:shade val="50000"/>
+              </a:schemeClr>
+            </a:lnRef>
+            <a:fillRef idx="1">
+              <a:schemeClr val="accent1"/>
+            </a:fillRef>
+            <a:effectRef idx="0">
+              <a:schemeClr val="accent1"/>
+            </a:effectRef>
+            <a:fontRef idx="minor">
+              <a:schemeClr val="lt1"/>
+            </a:fontRef>
+          </p:style>
+          <p:txBody>
+            <a:bodyPr rtlCol="0" anchor="ctr"/>
+            <a:lstStyle/>
+            <a:p>
+              <a:pPr algn="ctr"/>
+              <a:r>
+                <a:rPr lang="en-BE" dirty="0">
+                  <a:latin typeface="Open Sans" panose="020B0606030504020204" pitchFamily="34" charset="0"/>
+                  <a:ea typeface="Open Sans" panose="020B0606030504020204" pitchFamily="34" charset="0"/>
+                  <a:cs typeface="Open Sans" panose="020B0606030504020204" pitchFamily="34" charset="0"/>
+                </a:rPr>
+                <a:t>1</a:t>
+              </a:r>
+            </a:p>
+          </p:txBody>
+        </p:sp>
+        <p:sp>
+          <p:nvSpPr>
+            <p:cNvPr id="15" name="Oval 14">
+              <a:extLst>
+                <a:ext uri="{FF2B5EF4-FFF2-40B4-BE49-F238E27FC236}">
+                  <a16:creationId xmlns:a16="http://schemas.microsoft.com/office/drawing/2014/main" id="{B0E6C160-02F2-EFC7-FD9E-994FCF874B8E}"/>
+                </a:ext>
+              </a:extLst>
+            </p:cNvPr>
+            <p:cNvSpPr/>
+            <p:nvPr/>
+          </p:nvSpPr>
+          <p:spPr>
+            <a:xfrm>
+              <a:off x="6388434" y="3134067"/>
+              <a:ext cx="288032" cy="288032"/>
+            </a:xfrm>
+            <a:prstGeom prst="ellipse">
+              <a:avLst/>
+            </a:prstGeom>
+            <a:solidFill>
+              <a:srgbClr val="65318F"/>
+            </a:solidFill>
+            <a:ln>
+              <a:noFill/>
+            </a:ln>
+          </p:spPr>
+          <p:style>
+            <a:lnRef idx="2">
+              <a:schemeClr val="accent1">
+                <a:shade val="50000"/>
+              </a:schemeClr>
+            </a:lnRef>
+            <a:fillRef idx="1">
+              <a:schemeClr val="accent1"/>
+            </a:fillRef>
+            <a:effectRef idx="0">
+              <a:schemeClr val="accent1"/>
+            </a:effectRef>
+            <a:fontRef idx="minor">
+              <a:schemeClr val="lt1"/>
+            </a:fontRef>
+          </p:style>
+          <p:txBody>
+            <a:bodyPr rtlCol="0" anchor="ctr"/>
+            <a:lstStyle/>
+            <a:p>
+              <a:pPr algn="ctr"/>
+              <a:r>
+                <a:rPr lang="en-BE" dirty="0">
+                  <a:latin typeface="Open Sans" panose="020B0606030504020204" pitchFamily="34" charset="0"/>
+                  <a:ea typeface="Open Sans" panose="020B0606030504020204" pitchFamily="34" charset="0"/>
+                  <a:cs typeface="Open Sans" panose="020B0606030504020204" pitchFamily="34" charset="0"/>
+                </a:rPr>
+                <a:t>3</a:t>
+              </a:r>
+            </a:p>
+          </p:txBody>
+        </p:sp>
+        <p:sp>
+          <p:nvSpPr>
+            <p:cNvPr id="20" name="TextBox 19">
+              <a:extLst>
+                <a:ext uri="{FF2B5EF4-FFF2-40B4-BE49-F238E27FC236}">
+                  <a16:creationId xmlns:a16="http://schemas.microsoft.com/office/drawing/2014/main" id="{74CA381C-5730-2AB8-6331-84C73FE4225B}"/>
+                </a:ext>
+              </a:extLst>
+            </p:cNvPr>
+            <p:cNvSpPr txBox="1"/>
+            <p:nvPr/>
+          </p:nvSpPr>
+          <p:spPr>
+            <a:xfrm>
+              <a:off x="3384446" y="3851756"/>
+              <a:ext cx="3107580" cy="369332"/>
+            </a:xfrm>
+            <a:prstGeom prst="rect">
+              <a:avLst/>
+            </a:prstGeom>
             <a:noFill/>
-          </a:ln>
-        </p:spPr>
-        <p:style>
-          <a:lnRef idx="2">
-            <a:schemeClr val="accent1">
-              <a:shade val="50000"/>
-            </a:schemeClr>
-          </a:lnRef>
-          <a:fillRef idx="1">
-            <a:schemeClr val="accent1"/>
-          </a:fillRef>
-          <a:effectRef idx="0">
-            <a:schemeClr val="accent1"/>
-          </a:effectRef>
-          <a:fontRef idx="minor">
-            <a:schemeClr val="lt1"/>
-          </a:fontRef>
-        </p:style>
-        <p:txBody>
-          <a:bodyPr rtlCol="0" anchor="ctr"/>
-          <a:lstStyle/>
-          <a:p>
-            <a:pPr algn="ctr"/>
-            <a:r>
-              <a:rPr lang="en-BE" dirty="0">
-                <a:latin typeface="Open Sans" panose="020B0606030504020204" pitchFamily="34" charset="0"/>
-                <a:ea typeface="Open Sans" panose="020B0606030504020204" pitchFamily="34" charset="0"/>
-                <a:cs typeface="Open Sans" panose="020B0606030504020204" pitchFamily="34" charset="0"/>
-              </a:rPr>
-              <a:t>2</a:t>
-            </a:r>
-          </a:p>
-        </p:txBody>
-      </p:sp>
-      <p:sp>
-        <p:nvSpPr>
-          <p:cNvPr id="10" name="Oval 9">
-            <a:extLst>
-              <a:ext uri="{FF2B5EF4-FFF2-40B4-BE49-F238E27FC236}">
-                <a16:creationId xmlns:a16="http://schemas.microsoft.com/office/drawing/2014/main" id="{993C3FF0-041F-1631-55DB-E49C8FE62629}"/>
-              </a:ext>
-            </a:extLst>
-          </p:cNvPr>
-          <p:cNvSpPr/>
-          <p:nvPr/>
-        </p:nvSpPr>
-        <p:spPr>
-          <a:xfrm>
-            <a:off x="6421366" y="3008533"/>
-            <a:ext cx="288032" cy="288032"/>
-          </a:xfrm>
-          <a:prstGeom prst="ellipse">
-            <a:avLst/>
-          </a:prstGeom>
-          <a:solidFill>
-            <a:srgbClr val="65318F"/>
-          </a:solidFill>
-          <a:ln>
+          </p:spPr>
+          <p:txBody>
+            <a:bodyPr wrap="square" rtlCol="0">
+              <a:spAutoFit/>
+            </a:bodyPr>
+            <a:lstStyle/>
+            <a:p>
+              <a:r>
+                <a:rPr lang="en-BE" dirty="0">
+                  <a:latin typeface="Roboto" panose="02000000000000000000" pitchFamily="2" charset="0"/>
+                  <a:ea typeface="Roboto" panose="02000000000000000000" pitchFamily="2" charset="0"/>
+                </a:rPr>
+                <a:t>Section 1, 2 &amp; 3</a:t>
+              </a:r>
+            </a:p>
+          </p:txBody>
+        </p:sp>
+        <p:cxnSp>
+          <p:nvCxnSpPr>
+            <p:cNvPr id="24" name="Straight Connector 23">
+              <a:extLst>
+                <a:ext uri="{FF2B5EF4-FFF2-40B4-BE49-F238E27FC236}">
+                  <a16:creationId xmlns:a16="http://schemas.microsoft.com/office/drawing/2014/main" id="{BC1922FC-0B94-1EA6-2F14-6EB70FD0C5DF}"/>
+                </a:ext>
+              </a:extLst>
+            </p:cNvPr>
+            <p:cNvCxnSpPr/>
+            <p:nvPr/>
+          </p:nvCxnSpPr>
+          <p:spPr>
+            <a:xfrm>
+              <a:off x="4170934" y="3574747"/>
+              <a:ext cx="0" cy="288032"/>
+            </a:xfrm>
+            <a:prstGeom prst="line">
+              <a:avLst/>
+            </a:prstGeom>
+            <a:ln w="12700">
+              <a:solidFill>
+                <a:schemeClr val="bg1">
+                  <a:lumMod val="75000"/>
+                </a:schemeClr>
+              </a:solidFill>
+            </a:ln>
+          </p:spPr>
+          <p:style>
+            <a:lnRef idx="1">
+              <a:schemeClr val="accent1"/>
+            </a:lnRef>
+            <a:fillRef idx="0">
+              <a:schemeClr val="accent1"/>
+            </a:fillRef>
+            <a:effectRef idx="0">
+              <a:schemeClr val="accent1"/>
+            </a:effectRef>
+            <a:fontRef idx="minor">
+              <a:schemeClr val="tx1"/>
+            </a:fontRef>
+          </p:style>
+        </p:cxnSp>
+        <p:cxnSp>
+          <p:nvCxnSpPr>
+            <p:cNvPr id="25" name="Straight Connector 24">
+              <a:extLst>
+                <a:ext uri="{FF2B5EF4-FFF2-40B4-BE49-F238E27FC236}">
+                  <a16:creationId xmlns:a16="http://schemas.microsoft.com/office/drawing/2014/main" id="{1588CA34-02FF-A9B8-AE11-0213CCC2E266}"/>
+                </a:ext>
+              </a:extLst>
+            </p:cNvPr>
+            <p:cNvCxnSpPr>
+              <a:cxnSpLocks/>
+            </p:cNvCxnSpPr>
+            <p:nvPr/>
+          </p:nvCxnSpPr>
+          <p:spPr>
+            <a:xfrm flipV="1">
+              <a:off x="4040422" y="3570693"/>
+              <a:ext cx="274528" cy="4054"/>
+            </a:xfrm>
+            <a:prstGeom prst="line">
+              <a:avLst/>
+            </a:prstGeom>
+            <a:ln w="12700">
+              <a:solidFill>
+                <a:schemeClr val="bg1">
+                  <a:lumMod val="75000"/>
+                </a:schemeClr>
+              </a:solidFill>
+            </a:ln>
+          </p:spPr>
+          <p:style>
+            <a:lnRef idx="1">
+              <a:schemeClr val="accent1"/>
+            </a:lnRef>
+            <a:fillRef idx="0">
+              <a:schemeClr val="accent1"/>
+            </a:fillRef>
+            <a:effectRef idx="0">
+              <a:schemeClr val="accent1"/>
+            </a:effectRef>
+            <a:fontRef idx="minor">
+              <a:schemeClr val="tx1"/>
+            </a:fontRef>
+          </p:style>
+        </p:cxnSp>
+        <p:cxnSp>
+          <p:nvCxnSpPr>
+            <p:cNvPr id="37" name="Straight Connector 36">
+              <a:extLst>
+                <a:ext uri="{FF2B5EF4-FFF2-40B4-BE49-F238E27FC236}">
+                  <a16:creationId xmlns:a16="http://schemas.microsoft.com/office/drawing/2014/main" id="{4BB8B9ED-873B-F033-92C1-7D9AD8ADE83D}"/>
+                </a:ext>
+              </a:extLst>
+            </p:cNvPr>
+            <p:cNvCxnSpPr/>
+            <p:nvPr/>
+          </p:nvCxnSpPr>
+          <p:spPr>
+            <a:xfrm>
+              <a:off x="5351692" y="2630011"/>
+              <a:ext cx="0" cy="288032"/>
+            </a:xfrm>
+            <a:prstGeom prst="line">
+              <a:avLst/>
+            </a:prstGeom>
+            <a:ln w="12700">
+              <a:solidFill>
+                <a:schemeClr val="bg1">
+                  <a:lumMod val="75000"/>
+                </a:schemeClr>
+              </a:solidFill>
+            </a:ln>
+          </p:spPr>
+          <p:style>
+            <a:lnRef idx="1">
+              <a:schemeClr val="accent1"/>
+            </a:lnRef>
+            <a:fillRef idx="0">
+              <a:schemeClr val="accent1"/>
+            </a:fillRef>
+            <a:effectRef idx="0">
+              <a:schemeClr val="accent1"/>
+            </a:effectRef>
+            <a:fontRef idx="minor">
+              <a:schemeClr val="tx1"/>
+            </a:fontRef>
+          </p:style>
+        </p:cxnSp>
+        <p:sp>
+          <p:nvSpPr>
+            <p:cNvPr id="38" name="TextBox 37">
+              <a:extLst>
+                <a:ext uri="{FF2B5EF4-FFF2-40B4-BE49-F238E27FC236}">
+                  <a16:creationId xmlns:a16="http://schemas.microsoft.com/office/drawing/2014/main" id="{65921716-A323-1E9D-8D5C-60105685D98A}"/>
+                </a:ext>
+              </a:extLst>
+            </p:cNvPr>
+            <p:cNvSpPr txBox="1"/>
+            <p:nvPr/>
+          </p:nvSpPr>
+          <p:spPr>
+            <a:xfrm>
+              <a:off x="3856918" y="2186382"/>
+              <a:ext cx="3107580" cy="369332"/>
+            </a:xfrm>
+            <a:prstGeom prst="rect">
+              <a:avLst/>
+            </a:prstGeom>
             <a:noFill/>
-          </a:ln>
-        </p:spPr>
-        <p:style>
-          <a:lnRef idx="2">
-            <a:schemeClr val="accent1">
-              <a:shade val="50000"/>
-            </a:schemeClr>
-          </a:lnRef>
-          <a:fillRef idx="1">
-            <a:schemeClr val="accent1"/>
-          </a:fillRef>
-          <a:effectRef idx="0">
-            <a:schemeClr val="accent1"/>
-          </a:effectRef>
-          <a:fontRef idx="minor">
-            <a:schemeClr val="lt1"/>
-          </a:fontRef>
-        </p:style>
-        <p:txBody>
-          <a:bodyPr rtlCol="0" anchor="ctr"/>
-          <a:lstStyle/>
-          <a:p>
-            <a:pPr algn="ctr"/>
-            <a:r>
-              <a:rPr lang="en-BE" dirty="0">
-                <a:latin typeface="Open Sans" panose="020B0606030504020204" pitchFamily="34" charset="0"/>
-                <a:ea typeface="Open Sans" panose="020B0606030504020204" pitchFamily="34" charset="0"/>
-                <a:cs typeface="Open Sans" panose="020B0606030504020204" pitchFamily="34" charset="0"/>
-              </a:rPr>
-              <a:t>4</a:t>
-            </a:r>
-          </a:p>
-        </p:txBody>
-      </p:sp>
-      <p:sp>
-        <p:nvSpPr>
-          <p:cNvPr id="13" name="Oval 12">
-            <a:extLst>
-              <a:ext uri="{FF2B5EF4-FFF2-40B4-BE49-F238E27FC236}">
-                <a16:creationId xmlns:a16="http://schemas.microsoft.com/office/drawing/2014/main" id="{5BA6FFF1-3017-7762-B645-5204C8C39BC6}"/>
-              </a:ext>
-            </a:extLst>
-          </p:cNvPr>
-          <p:cNvSpPr/>
-          <p:nvPr/>
-        </p:nvSpPr>
-        <p:spPr>
-          <a:xfrm>
-            <a:off x="2879092" y="3008533"/>
-            <a:ext cx="288032" cy="288032"/>
-          </a:xfrm>
-          <a:prstGeom prst="ellipse">
-            <a:avLst/>
-          </a:prstGeom>
-          <a:solidFill>
-            <a:schemeClr val="tx2"/>
-          </a:solidFill>
-          <a:ln>
+          </p:spPr>
+          <p:txBody>
+            <a:bodyPr wrap="square" rtlCol="0">
+              <a:spAutoFit/>
+            </a:bodyPr>
+            <a:lstStyle/>
+            <a:p>
+              <a:pPr algn="ctr"/>
+              <a:r>
+                <a:rPr lang="en-BE" dirty="0">
+                  <a:latin typeface="Roboto" panose="02000000000000000000" pitchFamily="2" charset="0"/>
+                  <a:ea typeface="Roboto" panose="02000000000000000000" pitchFamily="2" charset="0"/>
+                </a:rPr>
+                <a:t>Test Lab 1 + Section 4, 5 &amp; 6</a:t>
+              </a:r>
+            </a:p>
+          </p:txBody>
+        </p:sp>
+        <p:cxnSp>
+          <p:nvCxnSpPr>
+            <p:cNvPr id="5" name="Straight Connector 4">
+              <a:extLst>
+                <a:ext uri="{FF2B5EF4-FFF2-40B4-BE49-F238E27FC236}">
+                  <a16:creationId xmlns:a16="http://schemas.microsoft.com/office/drawing/2014/main" id="{8EC9ED70-A2A0-3380-EB6D-A3C544560ACC}"/>
+                </a:ext>
+              </a:extLst>
+            </p:cNvPr>
+            <p:cNvCxnSpPr>
+              <a:cxnSpLocks/>
+            </p:cNvCxnSpPr>
+            <p:nvPr/>
+          </p:nvCxnSpPr>
+          <p:spPr>
+            <a:xfrm flipV="1">
+              <a:off x="5225915" y="2921097"/>
+              <a:ext cx="274528" cy="4054"/>
+            </a:xfrm>
+            <a:prstGeom prst="line">
+              <a:avLst/>
+            </a:prstGeom>
+            <a:ln w="12700">
+              <a:solidFill>
+                <a:schemeClr val="bg1">
+                  <a:lumMod val="75000"/>
+                </a:schemeClr>
+              </a:solidFill>
+            </a:ln>
+          </p:spPr>
+          <p:style>
+            <a:lnRef idx="1">
+              <a:schemeClr val="accent1"/>
+            </a:lnRef>
+            <a:fillRef idx="0">
+              <a:schemeClr val="accent1"/>
+            </a:fillRef>
+            <a:effectRef idx="0">
+              <a:schemeClr val="accent1"/>
+            </a:effectRef>
+            <a:fontRef idx="minor">
+              <a:schemeClr val="tx1"/>
+            </a:fontRef>
+          </p:style>
+        </p:cxnSp>
+        <p:cxnSp>
+          <p:nvCxnSpPr>
+            <p:cNvPr id="6" name="Straight Connector 5">
+              <a:extLst>
+                <a:ext uri="{FF2B5EF4-FFF2-40B4-BE49-F238E27FC236}">
+                  <a16:creationId xmlns:a16="http://schemas.microsoft.com/office/drawing/2014/main" id="{60A4F342-2D6C-AEE2-8644-8A267F71341E}"/>
+                </a:ext>
+              </a:extLst>
+            </p:cNvPr>
+            <p:cNvCxnSpPr>
+              <a:cxnSpLocks/>
+            </p:cNvCxnSpPr>
+            <p:nvPr/>
+          </p:nvCxnSpPr>
+          <p:spPr>
+            <a:xfrm rot="16200000">
+              <a:off x="6523746" y="3430415"/>
+              <a:ext cx="0" cy="288032"/>
+            </a:xfrm>
+            <a:prstGeom prst="line">
+              <a:avLst/>
+            </a:prstGeom>
+            <a:ln w="12700">
+              <a:solidFill>
+                <a:schemeClr val="bg1">
+                  <a:lumMod val="75000"/>
+                </a:schemeClr>
+              </a:solidFill>
+            </a:ln>
+          </p:spPr>
+          <p:style>
+            <a:lnRef idx="1">
+              <a:schemeClr val="accent1"/>
+            </a:lnRef>
+            <a:fillRef idx="0">
+              <a:schemeClr val="accent1"/>
+            </a:fillRef>
+            <a:effectRef idx="0">
+              <a:schemeClr val="accent1"/>
+            </a:effectRef>
+            <a:fontRef idx="minor">
+              <a:schemeClr val="tx1"/>
+            </a:fontRef>
+          </p:style>
+        </p:cxnSp>
+        <p:cxnSp>
+          <p:nvCxnSpPr>
+            <p:cNvPr id="7" name="Straight Connector 6">
+              <a:extLst>
+                <a:ext uri="{FF2B5EF4-FFF2-40B4-BE49-F238E27FC236}">
+                  <a16:creationId xmlns:a16="http://schemas.microsoft.com/office/drawing/2014/main" id="{DCC82590-FF54-084A-AC5C-8EA9C212BFE3}"/>
+                </a:ext>
+              </a:extLst>
+            </p:cNvPr>
+            <p:cNvCxnSpPr>
+              <a:cxnSpLocks/>
+            </p:cNvCxnSpPr>
+            <p:nvPr/>
+          </p:nvCxnSpPr>
+          <p:spPr>
+            <a:xfrm rot="16200000" flipV="1">
+              <a:off x="6388509" y="3703275"/>
+              <a:ext cx="274528" cy="4054"/>
+            </a:xfrm>
+            <a:prstGeom prst="line">
+              <a:avLst/>
+            </a:prstGeom>
+            <a:ln w="12700">
+              <a:solidFill>
+                <a:schemeClr val="bg1">
+                  <a:lumMod val="75000"/>
+                </a:schemeClr>
+              </a:solidFill>
+            </a:ln>
+          </p:spPr>
+          <p:style>
+            <a:lnRef idx="1">
+              <a:schemeClr val="accent1"/>
+            </a:lnRef>
+            <a:fillRef idx="0">
+              <a:schemeClr val="accent1"/>
+            </a:fillRef>
+            <a:effectRef idx="0">
+              <a:schemeClr val="accent1"/>
+            </a:effectRef>
+            <a:fontRef idx="minor">
+              <a:schemeClr val="tx1"/>
+            </a:fontRef>
+          </p:style>
+        </p:cxnSp>
+        <p:sp>
+          <p:nvSpPr>
+            <p:cNvPr id="8" name="TextBox 7">
+              <a:extLst>
+                <a:ext uri="{FF2B5EF4-FFF2-40B4-BE49-F238E27FC236}">
+                  <a16:creationId xmlns:a16="http://schemas.microsoft.com/office/drawing/2014/main" id="{BF1AC3BE-F77B-2CDF-1C1F-15784ABDE646}"/>
+                </a:ext>
+              </a:extLst>
+            </p:cNvPr>
+            <p:cNvSpPr txBox="1"/>
+            <p:nvPr/>
+          </p:nvSpPr>
+          <p:spPr>
+            <a:xfrm>
+              <a:off x="5724724" y="3839783"/>
+              <a:ext cx="3107580" cy="369332"/>
+            </a:xfrm>
+            <a:prstGeom prst="rect">
+              <a:avLst/>
+            </a:prstGeom>
             <a:noFill/>
-          </a:ln>
-        </p:spPr>
-        <p:style>
-          <a:lnRef idx="2">
-            <a:schemeClr val="accent1">
-              <a:shade val="50000"/>
-            </a:schemeClr>
-          </a:lnRef>
-          <a:fillRef idx="1">
-            <a:schemeClr val="accent1"/>
-          </a:fillRef>
-          <a:effectRef idx="0">
-            <a:schemeClr val="accent1"/>
-          </a:effectRef>
-          <a:fontRef idx="minor">
-            <a:schemeClr val="lt1"/>
-          </a:fontRef>
-        </p:style>
-        <p:txBody>
-          <a:bodyPr rtlCol="0" anchor="ctr"/>
-          <a:lstStyle/>
-          <a:p>
-            <a:pPr algn="ctr"/>
-            <a:r>
-              <a:rPr lang="en-BE" dirty="0">
-                <a:latin typeface="Open Sans" panose="020B0606030504020204" pitchFamily="34" charset="0"/>
-                <a:ea typeface="Open Sans" panose="020B0606030504020204" pitchFamily="34" charset="0"/>
-                <a:cs typeface="Open Sans" panose="020B0606030504020204" pitchFamily="34" charset="0"/>
-              </a:rPr>
-              <a:t>1</a:t>
-            </a:r>
-          </a:p>
-        </p:txBody>
-      </p:sp>
-      <p:sp>
-        <p:nvSpPr>
-          <p:cNvPr id="15" name="Oval 14">
-            <a:extLst>
-              <a:ext uri="{FF2B5EF4-FFF2-40B4-BE49-F238E27FC236}">
-                <a16:creationId xmlns:a16="http://schemas.microsoft.com/office/drawing/2014/main" id="{B0E6C160-02F2-EFC7-FD9E-994FCF874B8E}"/>
-              </a:ext>
-            </a:extLst>
-          </p:cNvPr>
-          <p:cNvSpPr/>
-          <p:nvPr/>
-        </p:nvSpPr>
-        <p:spPr>
-          <a:xfrm>
-            <a:off x="5240608" y="3008533"/>
-            <a:ext cx="288032" cy="288032"/>
-          </a:xfrm>
-          <a:prstGeom prst="ellipse">
-            <a:avLst/>
-          </a:prstGeom>
-          <a:solidFill>
-            <a:schemeClr val="tx2"/>
-          </a:solidFill>
-          <a:ln>
-            <a:noFill/>
-          </a:ln>
-        </p:spPr>
-        <p:style>
-          <a:lnRef idx="2">
-            <a:schemeClr val="accent1">
-              <a:shade val="50000"/>
-            </a:schemeClr>
-          </a:lnRef>
-          <a:fillRef idx="1">
-            <a:schemeClr val="accent1"/>
-          </a:fillRef>
-          <a:effectRef idx="0">
-            <a:schemeClr val="accent1"/>
-          </a:effectRef>
-          <a:fontRef idx="minor">
-            <a:schemeClr val="lt1"/>
-          </a:fontRef>
-        </p:style>
-        <p:txBody>
-          <a:bodyPr rtlCol="0" anchor="ctr"/>
-          <a:lstStyle/>
-          <a:p>
-            <a:pPr algn="ctr"/>
-            <a:r>
-              <a:rPr lang="en-BE" dirty="0">
-                <a:latin typeface="Open Sans" panose="020B0606030504020204" pitchFamily="34" charset="0"/>
-                <a:ea typeface="Open Sans" panose="020B0606030504020204" pitchFamily="34" charset="0"/>
-                <a:cs typeface="Open Sans" panose="020B0606030504020204" pitchFamily="34" charset="0"/>
-              </a:rPr>
-              <a:t>3</a:t>
-            </a:r>
-          </a:p>
-        </p:txBody>
-      </p:sp>
-      <p:sp>
-        <p:nvSpPr>
-          <p:cNvPr id="16" name="Oval 15">
-            <a:extLst>
-              <a:ext uri="{FF2B5EF4-FFF2-40B4-BE49-F238E27FC236}">
-                <a16:creationId xmlns:a16="http://schemas.microsoft.com/office/drawing/2014/main" id="{4B2D8261-DBA9-14B1-FF41-0074FB4E9387}"/>
-              </a:ext>
-            </a:extLst>
-          </p:cNvPr>
-          <p:cNvSpPr/>
-          <p:nvPr/>
-        </p:nvSpPr>
-        <p:spPr>
-          <a:xfrm>
-            <a:off x="7602124" y="3008533"/>
-            <a:ext cx="288032" cy="288032"/>
-          </a:xfrm>
-          <a:prstGeom prst="ellipse">
-            <a:avLst/>
-          </a:prstGeom>
-          <a:solidFill>
-            <a:schemeClr val="tx2"/>
-          </a:solidFill>
-          <a:ln>
-            <a:noFill/>
-          </a:ln>
-        </p:spPr>
-        <p:style>
-          <a:lnRef idx="2">
-            <a:schemeClr val="accent1">
-              <a:shade val="50000"/>
-            </a:schemeClr>
-          </a:lnRef>
-          <a:fillRef idx="1">
-            <a:schemeClr val="accent1"/>
-          </a:fillRef>
-          <a:effectRef idx="0">
-            <a:schemeClr val="accent1"/>
-          </a:effectRef>
-          <a:fontRef idx="minor">
-            <a:schemeClr val="lt1"/>
-          </a:fontRef>
-        </p:style>
-        <p:txBody>
-          <a:bodyPr rtlCol="0" anchor="ctr"/>
-          <a:lstStyle/>
-          <a:p>
-            <a:pPr algn="ctr"/>
-            <a:r>
-              <a:rPr lang="en-BE" dirty="0">
-                <a:latin typeface="Open Sans" panose="020B0606030504020204" pitchFamily="34" charset="0"/>
-                <a:ea typeface="Open Sans" panose="020B0606030504020204" pitchFamily="34" charset="0"/>
-                <a:cs typeface="Open Sans" panose="020B0606030504020204" pitchFamily="34" charset="0"/>
-              </a:rPr>
-              <a:t>5</a:t>
-            </a:r>
-          </a:p>
-        </p:txBody>
-      </p:sp>
-      <p:sp>
-        <p:nvSpPr>
-          <p:cNvPr id="17" name="Oval 16">
-            <a:extLst>
-              <a:ext uri="{FF2B5EF4-FFF2-40B4-BE49-F238E27FC236}">
-                <a16:creationId xmlns:a16="http://schemas.microsoft.com/office/drawing/2014/main" id="{F96A8CCD-47BC-5E24-8666-3B738EA333BE}"/>
-              </a:ext>
-            </a:extLst>
-          </p:cNvPr>
-          <p:cNvSpPr/>
-          <p:nvPr/>
-        </p:nvSpPr>
-        <p:spPr>
-          <a:xfrm>
-            <a:off x="8782882" y="3008533"/>
-            <a:ext cx="288032" cy="288032"/>
-          </a:xfrm>
-          <a:prstGeom prst="ellipse">
-            <a:avLst/>
-          </a:prstGeom>
-          <a:solidFill>
-            <a:srgbClr val="F59231"/>
-          </a:solidFill>
-          <a:ln>
-            <a:noFill/>
-          </a:ln>
-        </p:spPr>
-        <p:style>
-          <a:lnRef idx="2">
-            <a:schemeClr val="accent1">
-              <a:shade val="50000"/>
-            </a:schemeClr>
-          </a:lnRef>
-          <a:fillRef idx="1">
-            <a:schemeClr val="accent1"/>
-          </a:fillRef>
-          <a:effectRef idx="0">
-            <a:schemeClr val="accent1"/>
-          </a:effectRef>
-          <a:fontRef idx="minor">
-            <a:schemeClr val="lt1"/>
-          </a:fontRef>
-        </p:style>
-        <p:txBody>
-          <a:bodyPr rtlCol="0" anchor="ctr"/>
-          <a:lstStyle/>
-          <a:p>
-            <a:pPr algn="ctr"/>
-            <a:r>
-              <a:rPr lang="en-BE" dirty="0">
-                <a:latin typeface="Open Sans" panose="020B0606030504020204" pitchFamily="34" charset="0"/>
-                <a:ea typeface="Open Sans" panose="020B0606030504020204" pitchFamily="34" charset="0"/>
-                <a:cs typeface="Open Sans" panose="020B0606030504020204" pitchFamily="34" charset="0"/>
-              </a:rPr>
-              <a:t>6</a:t>
-            </a:r>
-          </a:p>
-        </p:txBody>
-      </p:sp>
-      <p:sp>
-        <p:nvSpPr>
-          <p:cNvPr id="20" name="TextBox 19">
-            <a:extLst>
-              <a:ext uri="{FF2B5EF4-FFF2-40B4-BE49-F238E27FC236}">
-                <a16:creationId xmlns:a16="http://schemas.microsoft.com/office/drawing/2014/main" id="{74CA381C-5730-2AB8-6331-84C73FE4225B}"/>
-              </a:ext>
-            </a:extLst>
-          </p:cNvPr>
-          <p:cNvSpPr txBox="1"/>
-          <p:nvPr/>
-        </p:nvSpPr>
-        <p:spPr>
-          <a:xfrm>
-            <a:off x="2914200" y="3872906"/>
-            <a:ext cx="3107580" cy="369332"/>
-          </a:xfrm>
-          <a:prstGeom prst="rect">
-            <a:avLst/>
-          </a:prstGeom>
-          <a:noFill/>
-        </p:spPr>
-        <p:txBody>
-          <a:bodyPr wrap="square" rtlCol="0">
-            <a:spAutoFit/>
-          </a:bodyPr>
-          <a:lstStyle/>
-          <a:p>
-            <a:r>
-              <a:rPr lang="en-BE" dirty="0">
-                <a:latin typeface="Roboto" panose="02000000000000000000" pitchFamily="2" charset="0"/>
-                <a:ea typeface="Roboto" panose="02000000000000000000" pitchFamily="2" charset="0"/>
-              </a:rPr>
-              <a:t>Section 1, 2 &amp; 3</a:t>
-            </a:r>
-          </a:p>
-        </p:txBody>
-      </p:sp>
-      <p:sp>
-        <p:nvSpPr>
-          <p:cNvPr id="21" name="TextBox 20">
-            <a:extLst>
-              <a:ext uri="{FF2B5EF4-FFF2-40B4-BE49-F238E27FC236}">
-                <a16:creationId xmlns:a16="http://schemas.microsoft.com/office/drawing/2014/main" id="{FC0371C1-233F-C9E4-B071-793E97E63009}"/>
-              </a:ext>
-            </a:extLst>
-          </p:cNvPr>
-          <p:cNvSpPr txBox="1"/>
-          <p:nvPr/>
-        </p:nvSpPr>
-        <p:spPr>
-          <a:xfrm>
-            <a:off x="4653308" y="4735555"/>
-            <a:ext cx="3107580" cy="369332"/>
-          </a:xfrm>
-          <a:prstGeom prst="rect">
-            <a:avLst/>
-          </a:prstGeom>
-          <a:noFill/>
-        </p:spPr>
-        <p:txBody>
-          <a:bodyPr wrap="square" rtlCol="0">
-            <a:spAutoFit/>
-          </a:bodyPr>
-          <a:lstStyle/>
-          <a:p>
-            <a:r>
-              <a:rPr lang="en-BE">
-                <a:latin typeface="Roboto" panose="02000000000000000000" pitchFamily="2" charset="0"/>
-                <a:ea typeface="Roboto" panose="02000000000000000000" pitchFamily="2" charset="0"/>
-              </a:rPr>
-              <a:t>Section 4, 5 &amp; 6</a:t>
-            </a:r>
-            <a:endParaRPr lang="en-BE" dirty="0">
-              <a:latin typeface="Roboto" panose="02000000000000000000" pitchFamily="2" charset="0"/>
-              <a:ea typeface="Roboto" panose="02000000000000000000" pitchFamily="2" charset="0"/>
-            </a:endParaRPr>
-          </a:p>
-        </p:txBody>
-      </p:sp>
-      <p:sp>
-        <p:nvSpPr>
-          <p:cNvPr id="22" name="TextBox 21">
-            <a:extLst>
-              <a:ext uri="{FF2B5EF4-FFF2-40B4-BE49-F238E27FC236}">
-                <a16:creationId xmlns:a16="http://schemas.microsoft.com/office/drawing/2014/main" id="{21D0F762-7F2E-9BE8-A181-3351DBE0AEDC}"/>
-              </a:ext>
-            </a:extLst>
-          </p:cNvPr>
-          <p:cNvSpPr txBox="1"/>
-          <p:nvPr/>
-        </p:nvSpPr>
-        <p:spPr>
-          <a:xfrm>
-            <a:off x="5606955" y="3872906"/>
-            <a:ext cx="3107580" cy="369332"/>
-          </a:xfrm>
-          <a:prstGeom prst="rect">
-            <a:avLst/>
-          </a:prstGeom>
-          <a:noFill/>
-        </p:spPr>
-        <p:txBody>
-          <a:bodyPr wrap="square" rtlCol="0">
-            <a:spAutoFit/>
-          </a:bodyPr>
-          <a:lstStyle/>
-          <a:p>
-            <a:pPr algn="ctr"/>
-            <a:r>
-              <a:rPr lang="en-BE" dirty="0">
-                <a:latin typeface="Roboto" panose="02000000000000000000" pitchFamily="2" charset="0"/>
-                <a:ea typeface="Roboto" panose="02000000000000000000" pitchFamily="2" charset="0"/>
-              </a:rPr>
-              <a:t>Use Case</a:t>
-            </a:r>
-          </a:p>
-        </p:txBody>
-      </p:sp>
-      <p:cxnSp>
-        <p:nvCxnSpPr>
-          <p:cNvPr id="24" name="Straight Connector 23">
-            <a:extLst>
-              <a:ext uri="{FF2B5EF4-FFF2-40B4-BE49-F238E27FC236}">
-                <a16:creationId xmlns:a16="http://schemas.microsoft.com/office/drawing/2014/main" id="{BC1922FC-0B94-1EA6-2F14-6EB70FD0C5DF}"/>
-              </a:ext>
-            </a:extLst>
-          </p:cNvPr>
-          <p:cNvCxnSpPr/>
-          <p:nvPr/>
-        </p:nvCxnSpPr>
-        <p:spPr>
-          <a:xfrm>
-            <a:off x="3023108" y="3449213"/>
-            <a:ext cx="0" cy="288032"/>
-          </a:xfrm>
-          <a:prstGeom prst="line">
-            <a:avLst/>
-          </a:prstGeom>
-          <a:ln w="12700">
-            <a:solidFill>
-              <a:schemeClr val="bg1">
-                <a:lumMod val="75000"/>
-              </a:schemeClr>
-            </a:solidFill>
-          </a:ln>
-        </p:spPr>
-        <p:style>
-          <a:lnRef idx="1">
-            <a:schemeClr val="accent1"/>
-          </a:lnRef>
-          <a:fillRef idx="0">
-            <a:schemeClr val="accent1"/>
-          </a:fillRef>
-          <a:effectRef idx="0">
-            <a:schemeClr val="accent1"/>
-          </a:effectRef>
-          <a:fontRef idx="minor">
-            <a:schemeClr val="tx1"/>
-          </a:fontRef>
-        </p:style>
-      </p:cxnSp>
-      <p:cxnSp>
-        <p:nvCxnSpPr>
-          <p:cNvPr id="25" name="Straight Connector 24">
-            <a:extLst>
-              <a:ext uri="{FF2B5EF4-FFF2-40B4-BE49-F238E27FC236}">
-                <a16:creationId xmlns:a16="http://schemas.microsoft.com/office/drawing/2014/main" id="{1588CA34-02FF-A9B8-AE11-0213CCC2E266}"/>
-              </a:ext>
-            </a:extLst>
-          </p:cNvPr>
-          <p:cNvCxnSpPr>
-            <a:cxnSpLocks/>
-          </p:cNvCxnSpPr>
-          <p:nvPr/>
-        </p:nvCxnSpPr>
-        <p:spPr>
-          <a:xfrm flipV="1">
-            <a:off x="2892596" y="3445159"/>
-            <a:ext cx="274528" cy="4054"/>
-          </a:xfrm>
-          <a:prstGeom prst="line">
-            <a:avLst/>
-          </a:prstGeom>
-          <a:ln w="12700">
-            <a:solidFill>
-              <a:schemeClr val="bg1">
-                <a:lumMod val="75000"/>
-              </a:schemeClr>
-            </a:solidFill>
-          </a:ln>
-        </p:spPr>
-        <p:style>
-          <a:lnRef idx="1">
-            <a:schemeClr val="accent1"/>
-          </a:lnRef>
-          <a:fillRef idx="0">
-            <a:schemeClr val="accent1"/>
-          </a:fillRef>
-          <a:effectRef idx="0">
-            <a:schemeClr val="accent1"/>
-          </a:effectRef>
-          <a:fontRef idx="minor">
-            <a:schemeClr val="tx1"/>
-          </a:fontRef>
-        </p:style>
-      </p:cxnSp>
-      <p:cxnSp>
-        <p:nvCxnSpPr>
-          <p:cNvPr id="28" name="Straight Connector 27">
-            <a:extLst>
-              <a:ext uri="{FF2B5EF4-FFF2-40B4-BE49-F238E27FC236}">
-                <a16:creationId xmlns:a16="http://schemas.microsoft.com/office/drawing/2014/main" id="{6DB465E5-EF14-C26D-D8C0-7EFF9700D6C8}"/>
-              </a:ext>
-            </a:extLst>
-          </p:cNvPr>
-          <p:cNvCxnSpPr>
-            <a:cxnSpLocks/>
-          </p:cNvCxnSpPr>
-          <p:nvPr/>
-        </p:nvCxnSpPr>
-        <p:spPr>
-          <a:xfrm>
-            <a:off x="4797324" y="3464736"/>
-            <a:ext cx="0" cy="1261636"/>
-          </a:xfrm>
-          <a:prstGeom prst="line">
-            <a:avLst/>
-          </a:prstGeom>
-          <a:ln w="12700">
-            <a:solidFill>
-              <a:schemeClr val="bg1">
-                <a:lumMod val="75000"/>
-              </a:schemeClr>
-            </a:solidFill>
-          </a:ln>
-        </p:spPr>
-        <p:style>
-          <a:lnRef idx="1">
-            <a:schemeClr val="accent1"/>
-          </a:lnRef>
-          <a:fillRef idx="0">
-            <a:schemeClr val="accent1"/>
-          </a:fillRef>
-          <a:effectRef idx="0">
-            <a:schemeClr val="accent1"/>
-          </a:effectRef>
-          <a:fontRef idx="minor">
-            <a:schemeClr val="tx1"/>
-          </a:fontRef>
-        </p:style>
-      </p:cxnSp>
-      <p:cxnSp>
-        <p:nvCxnSpPr>
-          <p:cNvPr id="29" name="Straight Connector 28">
-            <a:extLst>
-              <a:ext uri="{FF2B5EF4-FFF2-40B4-BE49-F238E27FC236}">
-                <a16:creationId xmlns:a16="http://schemas.microsoft.com/office/drawing/2014/main" id="{52709D63-1649-2B7F-7417-C5DF7AF3D27B}"/>
-              </a:ext>
-            </a:extLst>
-          </p:cNvPr>
-          <p:cNvCxnSpPr>
-            <a:cxnSpLocks/>
-          </p:cNvCxnSpPr>
-          <p:nvPr/>
-        </p:nvCxnSpPr>
-        <p:spPr>
-          <a:xfrm flipV="1">
-            <a:off x="4106365" y="3460682"/>
-            <a:ext cx="1339031" cy="4054"/>
-          </a:xfrm>
-          <a:prstGeom prst="line">
-            <a:avLst/>
-          </a:prstGeom>
-          <a:ln w="12700">
-            <a:solidFill>
-              <a:schemeClr val="bg1">
-                <a:lumMod val="75000"/>
-              </a:schemeClr>
-            </a:solidFill>
-          </a:ln>
-        </p:spPr>
-        <p:style>
-          <a:lnRef idx="1">
-            <a:schemeClr val="accent1"/>
-          </a:lnRef>
-          <a:fillRef idx="0">
-            <a:schemeClr val="accent1"/>
-          </a:fillRef>
-          <a:effectRef idx="0">
-            <a:schemeClr val="accent1"/>
-          </a:effectRef>
-          <a:fontRef idx="minor">
-            <a:schemeClr val="tx1"/>
-          </a:fontRef>
-        </p:style>
-      </p:cxnSp>
-      <p:cxnSp>
-        <p:nvCxnSpPr>
-          <p:cNvPr id="33" name="Straight Connector 32">
-            <a:extLst>
-              <a:ext uri="{FF2B5EF4-FFF2-40B4-BE49-F238E27FC236}">
-                <a16:creationId xmlns:a16="http://schemas.microsoft.com/office/drawing/2014/main" id="{B39AEA4B-B861-636B-3B59-34E49D164002}"/>
-              </a:ext>
-            </a:extLst>
-          </p:cNvPr>
-          <p:cNvCxnSpPr>
-            <a:cxnSpLocks/>
-          </p:cNvCxnSpPr>
-          <p:nvPr/>
-        </p:nvCxnSpPr>
-        <p:spPr>
-          <a:xfrm flipV="1">
-            <a:off x="6474178" y="3451168"/>
-            <a:ext cx="1339031" cy="4054"/>
-          </a:xfrm>
-          <a:prstGeom prst="line">
-            <a:avLst/>
-          </a:prstGeom>
-          <a:ln w="12700">
-            <a:solidFill>
-              <a:schemeClr val="bg1">
-                <a:lumMod val="75000"/>
-              </a:schemeClr>
-            </a:solidFill>
-          </a:ln>
-        </p:spPr>
-        <p:style>
-          <a:lnRef idx="1">
-            <a:schemeClr val="accent1"/>
-          </a:lnRef>
-          <a:fillRef idx="0">
-            <a:schemeClr val="accent1"/>
-          </a:fillRef>
-          <a:effectRef idx="0">
-            <a:schemeClr val="accent1"/>
-          </a:effectRef>
-          <a:fontRef idx="minor">
-            <a:schemeClr val="tx1"/>
-          </a:fontRef>
-        </p:style>
-      </p:cxnSp>
-      <p:cxnSp>
-        <p:nvCxnSpPr>
-          <p:cNvPr id="35" name="Straight Connector 34">
-            <a:extLst>
-              <a:ext uri="{FF2B5EF4-FFF2-40B4-BE49-F238E27FC236}">
-                <a16:creationId xmlns:a16="http://schemas.microsoft.com/office/drawing/2014/main" id="{A1FD05DD-7989-34FF-FB8C-5B832E79BE14}"/>
-              </a:ext>
-            </a:extLst>
-          </p:cNvPr>
-          <p:cNvCxnSpPr/>
-          <p:nvPr/>
-        </p:nvCxnSpPr>
-        <p:spPr>
-          <a:xfrm>
-            <a:off x="7155261" y="3460682"/>
-            <a:ext cx="0" cy="288032"/>
-          </a:xfrm>
-          <a:prstGeom prst="line">
-            <a:avLst/>
-          </a:prstGeom>
-          <a:ln w="12700">
-            <a:solidFill>
-              <a:schemeClr val="bg1">
-                <a:lumMod val="75000"/>
-              </a:schemeClr>
-            </a:solidFill>
-          </a:ln>
-        </p:spPr>
-        <p:style>
-          <a:lnRef idx="1">
-            <a:schemeClr val="accent1"/>
-          </a:lnRef>
-          <a:fillRef idx="0">
-            <a:schemeClr val="accent1"/>
-          </a:fillRef>
-          <a:effectRef idx="0">
-            <a:schemeClr val="accent1"/>
-          </a:effectRef>
-          <a:fontRef idx="minor">
-            <a:schemeClr val="tx1"/>
-          </a:fontRef>
-        </p:style>
-      </p:cxnSp>
-      <p:cxnSp>
-        <p:nvCxnSpPr>
-          <p:cNvPr id="37" name="Straight Connector 36">
-            <a:extLst>
-              <a:ext uri="{FF2B5EF4-FFF2-40B4-BE49-F238E27FC236}">
-                <a16:creationId xmlns:a16="http://schemas.microsoft.com/office/drawing/2014/main" id="{4BB8B9ED-873B-F033-92C1-7D9AD8ADE83D}"/>
-              </a:ext>
-            </a:extLst>
-          </p:cNvPr>
-          <p:cNvCxnSpPr/>
-          <p:nvPr/>
-        </p:nvCxnSpPr>
-        <p:spPr>
-          <a:xfrm>
-            <a:off x="4203866" y="2504477"/>
-            <a:ext cx="0" cy="288032"/>
-          </a:xfrm>
-          <a:prstGeom prst="line">
-            <a:avLst/>
-          </a:prstGeom>
-          <a:ln w="12700">
-            <a:solidFill>
-              <a:schemeClr val="bg1">
-                <a:lumMod val="75000"/>
-              </a:schemeClr>
-            </a:solidFill>
-          </a:ln>
-        </p:spPr>
-        <p:style>
-          <a:lnRef idx="1">
-            <a:schemeClr val="accent1"/>
-          </a:lnRef>
-          <a:fillRef idx="0">
-            <a:schemeClr val="accent1"/>
-          </a:fillRef>
-          <a:effectRef idx="0">
-            <a:schemeClr val="accent1"/>
-          </a:effectRef>
-          <a:fontRef idx="minor">
-            <a:schemeClr val="tx1"/>
-          </a:fontRef>
-        </p:style>
-      </p:cxnSp>
-      <p:sp>
-        <p:nvSpPr>
-          <p:cNvPr id="38" name="TextBox 37">
-            <a:extLst>
-              <a:ext uri="{FF2B5EF4-FFF2-40B4-BE49-F238E27FC236}">
-                <a16:creationId xmlns:a16="http://schemas.microsoft.com/office/drawing/2014/main" id="{65921716-A323-1E9D-8D5C-60105685D98A}"/>
-              </a:ext>
-            </a:extLst>
-          </p:cNvPr>
-          <p:cNvSpPr txBox="1"/>
-          <p:nvPr/>
-        </p:nvSpPr>
-        <p:spPr>
-          <a:xfrm>
-            <a:off x="2709092" y="2060848"/>
-            <a:ext cx="3107580" cy="369332"/>
-          </a:xfrm>
-          <a:prstGeom prst="rect">
-            <a:avLst/>
-          </a:prstGeom>
-          <a:noFill/>
-        </p:spPr>
-        <p:txBody>
-          <a:bodyPr wrap="square" rtlCol="0">
-            <a:spAutoFit/>
-          </a:bodyPr>
-          <a:lstStyle/>
-          <a:p>
-            <a:pPr algn="ctr"/>
-            <a:r>
-              <a:rPr lang="en-BE" dirty="0">
-                <a:latin typeface="Roboto" panose="02000000000000000000" pitchFamily="2" charset="0"/>
-                <a:ea typeface="Roboto" panose="02000000000000000000" pitchFamily="2" charset="0"/>
-              </a:rPr>
-              <a:t>Test Lab 1 + Q4</a:t>
-            </a:r>
-          </a:p>
-        </p:txBody>
-      </p:sp>
-      <p:cxnSp>
-        <p:nvCxnSpPr>
-          <p:cNvPr id="39" name="Straight Connector 38">
-            <a:extLst>
-              <a:ext uri="{FF2B5EF4-FFF2-40B4-BE49-F238E27FC236}">
-                <a16:creationId xmlns:a16="http://schemas.microsoft.com/office/drawing/2014/main" id="{458C34B2-8DDA-9046-536C-10209C88E1AC}"/>
-              </a:ext>
-            </a:extLst>
-          </p:cNvPr>
-          <p:cNvCxnSpPr/>
-          <p:nvPr/>
-        </p:nvCxnSpPr>
-        <p:spPr>
-          <a:xfrm>
-            <a:off x="6576013" y="2506784"/>
-            <a:ext cx="0" cy="288032"/>
-          </a:xfrm>
-          <a:prstGeom prst="line">
-            <a:avLst/>
-          </a:prstGeom>
-          <a:ln w="12700">
-            <a:solidFill>
-              <a:schemeClr val="bg1">
-                <a:lumMod val="75000"/>
-              </a:schemeClr>
-            </a:solidFill>
-          </a:ln>
-        </p:spPr>
-        <p:style>
-          <a:lnRef idx="1">
-            <a:schemeClr val="accent1"/>
-          </a:lnRef>
-          <a:fillRef idx="0">
-            <a:schemeClr val="accent1"/>
-          </a:fillRef>
-          <a:effectRef idx="0">
-            <a:schemeClr val="accent1"/>
-          </a:effectRef>
-          <a:fontRef idx="minor">
-            <a:schemeClr val="tx1"/>
-          </a:fontRef>
-        </p:style>
-      </p:cxnSp>
-      <p:sp>
-        <p:nvSpPr>
-          <p:cNvPr id="40" name="TextBox 39">
-            <a:extLst>
-              <a:ext uri="{FF2B5EF4-FFF2-40B4-BE49-F238E27FC236}">
-                <a16:creationId xmlns:a16="http://schemas.microsoft.com/office/drawing/2014/main" id="{197BAE4A-77B6-5C1B-4F4E-0FD85CFBA031}"/>
-              </a:ext>
-            </a:extLst>
-          </p:cNvPr>
-          <p:cNvSpPr txBox="1"/>
-          <p:nvPr/>
-        </p:nvSpPr>
-        <p:spPr>
-          <a:xfrm>
-            <a:off x="5081239" y="2063155"/>
-            <a:ext cx="3107580" cy="369332"/>
-          </a:xfrm>
-          <a:prstGeom prst="rect">
-            <a:avLst/>
-          </a:prstGeom>
-          <a:noFill/>
-        </p:spPr>
-        <p:txBody>
-          <a:bodyPr wrap="square" rtlCol="0">
-            <a:spAutoFit/>
-          </a:bodyPr>
-          <a:lstStyle/>
-          <a:p>
-            <a:pPr algn="ctr"/>
-            <a:r>
-              <a:rPr lang="en-BE" dirty="0">
-                <a:latin typeface="Roboto" panose="02000000000000000000" pitchFamily="2" charset="0"/>
-                <a:ea typeface="Roboto" panose="02000000000000000000" pitchFamily="2" charset="0"/>
-              </a:rPr>
-              <a:t>Test Lab 2 &amp; 3</a:t>
-            </a:r>
-          </a:p>
-        </p:txBody>
-      </p:sp>
-      <p:cxnSp>
-        <p:nvCxnSpPr>
-          <p:cNvPr id="42" name="Straight Connector 41">
-            <a:extLst>
-              <a:ext uri="{FF2B5EF4-FFF2-40B4-BE49-F238E27FC236}">
-                <a16:creationId xmlns:a16="http://schemas.microsoft.com/office/drawing/2014/main" id="{6EBBE4B2-6A10-0ACD-0025-B78D2475B984}"/>
-              </a:ext>
-            </a:extLst>
-          </p:cNvPr>
-          <p:cNvCxnSpPr/>
-          <p:nvPr/>
-        </p:nvCxnSpPr>
-        <p:spPr>
-          <a:xfrm>
-            <a:off x="8925187" y="2509514"/>
-            <a:ext cx="0" cy="288032"/>
-          </a:xfrm>
-          <a:prstGeom prst="line">
-            <a:avLst/>
-          </a:prstGeom>
-          <a:ln w="12700">
-            <a:solidFill>
-              <a:schemeClr val="bg1">
-                <a:lumMod val="75000"/>
-              </a:schemeClr>
-            </a:solidFill>
-          </a:ln>
-        </p:spPr>
-        <p:style>
-          <a:lnRef idx="1">
-            <a:schemeClr val="accent1"/>
-          </a:lnRef>
-          <a:fillRef idx="0">
-            <a:schemeClr val="accent1"/>
-          </a:fillRef>
-          <a:effectRef idx="0">
-            <a:schemeClr val="accent1"/>
-          </a:effectRef>
-          <a:fontRef idx="minor">
-            <a:schemeClr val="tx1"/>
-          </a:fontRef>
-        </p:style>
-      </p:cxnSp>
-      <p:sp>
-        <p:nvSpPr>
-          <p:cNvPr id="43" name="TextBox 42">
-            <a:extLst>
-              <a:ext uri="{FF2B5EF4-FFF2-40B4-BE49-F238E27FC236}">
-                <a16:creationId xmlns:a16="http://schemas.microsoft.com/office/drawing/2014/main" id="{FCB52EBE-37C6-DDC6-ABE5-4C737DBF3FD9}"/>
-              </a:ext>
-            </a:extLst>
-          </p:cNvPr>
-          <p:cNvSpPr txBox="1"/>
-          <p:nvPr/>
-        </p:nvSpPr>
-        <p:spPr>
-          <a:xfrm>
-            <a:off x="7430413" y="2065885"/>
-            <a:ext cx="3107580" cy="369332"/>
-          </a:xfrm>
-          <a:prstGeom prst="rect">
-            <a:avLst/>
-          </a:prstGeom>
-          <a:noFill/>
-        </p:spPr>
-        <p:txBody>
-          <a:bodyPr wrap="square" rtlCol="0">
-            <a:spAutoFit/>
-          </a:bodyPr>
-          <a:lstStyle/>
-          <a:p>
-            <a:pPr algn="ctr"/>
-            <a:r>
-              <a:rPr lang="en-BE" dirty="0">
-                <a:latin typeface="Roboto" panose="02000000000000000000" pitchFamily="2" charset="0"/>
-                <a:ea typeface="Roboto" panose="02000000000000000000" pitchFamily="2" charset="0"/>
-              </a:rPr>
-              <a:t>Present use Case</a:t>
-            </a:r>
-          </a:p>
-        </p:txBody>
-      </p:sp>
+          </p:spPr>
+          <p:txBody>
+            <a:bodyPr wrap="square" rtlCol="0">
+              <a:spAutoFit/>
+            </a:bodyPr>
+            <a:lstStyle/>
+            <a:p>
+              <a:r>
+                <a:rPr lang="en-BE" dirty="0">
+                  <a:latin typeface="Roboto" panose="02000000000000000000" pitchFamily="2" charset="0"/>
+                  <a:ea typeface="Roboto" panose="02000000000000000000" pitchFamily="2" charset="0"/>
+                </a:rPr>
+                <a:t>Test Lab 2 + Q4</a:t>
+              </a:r>
+            </a:p>
+          </p:txBody>
+        </p:sp>
+      </p:grpSp>
     </p:spTree>
     <p:extLst>
       <p:ext uri="{BB962C8B-B14F-4D97-AF65-F5344CB8AC3E}">
@@ -13238,35 +13090,6 @@
               <a:rPr lang="en-BE" dirty="0"/>
               <a:t>Layer 2 versus layer 3</a:t>
             </a:r>
-          </a:p>
-        </p:txBody>
-      </p:sp>
-      <p:sp>
-        <p:nvSpPr>
-          <p:cNvPr id="3" name="Date Placeholder 2">
-            <a:extLst>
-              <a:ext uri="{FF2B5EF4-FFF2-40B4-BE49-F238E27FC236}">
-                <a16:creationId xmlns:a16="http://schemas.microsoft.com/office/drawing/2014/main" id="{BA3663FC-28FB-1FE2-5B3C-29ADEC13F0AE}"/>
-              </a:ext>
-            </a:extLst>
-          </p:cNvPr>
-          <p:cNvSpPr>
-            <a:spLocks noGrp="1"/>
-          </p:cNvSpPr>
-          <p:nvPr>
-            <p:ph type="dt" sz="half" idx="10"/>
-          </p:nvPr>
-        </p:nvSpPr>
-        <p:spPr/>
-        <p:txBody>
-          <a:bodyPr/>
-          <a:lstStyle/>
-          <a:p>
-            <a:fld id="{D1F088C9-0FC0-440B-8314-5EF9819A24DA}" type="datetime1">
-              <a:rPr lang="nl-BE" smtClean="0"/>
-              <a:t>27/09/2022</a:t>
-            </a:fld>
-            <a:endParaRPr lang="nl-BE" dirty="0"/>
           </a:p>
         </p:txBody>
       </p:sp>
@@ -14915,4 +14738,339 @@
   <a:objectDefaults/>
   <a:extraClrSchemeLst/>
 </a:theme>
+</file>
+
+<file path=customXml/item1.xml><?xml version="1.0" encoding="utf-8"?>
+<ct:contentTypeSchema xmlns:ct="http://schemas.microsoft.com/office/2006/metadata/contentType" xmlns:ma="http://schemas.microsoft.com/office/2006/metadata/properties/metaAttributes" ct:_="" ma:_="" ma:contentTypeName="Document" ma:contentTypeID="0x010100F636E510B83AE14BB768286DDA3060C8" ma:contentTypeVersion="21" ma:contentTypeDescription="Create a new document." ma:contentTypeScope="" ma:versionID="59622e832f8d78a7f837e7069c82ec99">
+  <xsd:schema xmlns:xsd="http://www.w3.org/2001/XMLSchema" xmlns:xs="http://www.w3.org/2001/XMLSchema" xmlns:p="http://schemas.microsoft.com/office/2006/metadata/properties" xmlns:ns2="c632d63d-d94d-44a4-8cd4-d414f261ccd2" xmlns:ns3="a966ec43-0ce2-440d-85cb-d7baa1361af9" targetNamespace="http://schemas.microsoft.com/office/2006/metadata/properties" ma:root="true" ma:fieldsID="4d6f63798877865b07a0269b92a3aab4" ns2:_="" ns3:_="">
+    <xsd:import namespace="c632d63d-d94d-44a4-8cd4-d414f261ccd2"/>
+    <xsd:import namespace="a966ec43-0ce2-440d-85cb-d7baa1361af9"/>
+    <xsd:element name="properties">
+      <xsd:complexType>
+        <xsd:sequence>
+          <xsd:element name="documentManagement">
+            <xsd:complexType>
+              <xsd:all>
+                <xsd:element ref="ns2:MediaServiceMetadata" minOccurs="0"/>
+                <xsd:element ref="ns2:MediaServiceFastMetadata" minOccurs="0"/>
+                <xsd:element ref="ns2:MediaServiceAutoKeyPoints" minOccurs="0"/>
+                <xsd:element ref="ns2:MediaServiceKeyPoints" minOccurs="0"/>
+                <xsd:element ref="ns2:MediaServiceDateTaken" minOccurs="0"/>
+                <xsd:element ref="ns2:MediaLengthInSeconds" minOccurs="0"/>
+                <xsd:element ref="ns3:TaxCatchAll" minOccurs="0"/>
+                <xsd:element ref="ns2:MediaServiceGenerationTime" minOccurs="0"/>
+                <xsd:element ref="ns2:MediaServiceEventHashCode" minOccurs="0"/>
+                <xsd:element ref="ns2:lcf76f155ced4ddcb4097134ff3c332f" minOccurs="0"/>
+                <xsd:element ref="ns2:MediaServiceOCR" minOccurs="0"/>
+                <xsd:element ref="ns2:MediaServiceLocation" minOccurs="0"/>
+                <xsd:element ref="ns3:SharedWithUsers" minOccurs="0"/>
+                <xsd:element ref="ns3:SharedWithDetails" minOccurs="0"/>
+                <xsd:element ref="ns2:MediaServiceObjectDetectorVersions" minOccurs="0"/>
+                <xsd:element ref="ns2:GillesCallebaut" minOccurs="0"/>
+                <xsd:element ref="ns2:Topics" minOccurs="0"/>
+                <xsd:element ref="ns2:MediaServiceSearchProperties" minOccurs="0"/>
+              </xsd:all>
+            </xsd:complexType>
+          </xsd:element>
+        </xsd:sequence>
+      </xsd:complexType>
+    </xsd:element>
+  </xsd:schema>
+  <xsd:schema xmlns:xsd="http://www.w3.org/2001/XMLSchema" xmlns:xs="http://www.w3.org/2001/XMLSchema" xmlns:dms="http://schemas.microsoft.com/office/2006/documentManagement/types" xmlns:pc="http://schemas.microsoft.com/office/infopath/2007/PartnerControls" targetNamespace="c632d63d-d94d-44a4-8cd4-d414f261ccd2" elementFormDefault="qualified">
+    <xsd:import namespace="http://schemas.microsoft.com/office/2006/documentManagement/types"/>
+    <xsd:import namespace="http://schemas.microsoft.com/office/infopath/2007/PartnerControls"/>
+    <xsd:element name="MediaServiceMetadata" ma:index="8" nillable="true" ma:displayName="MediaServiceMetadata" ma:hidden="true" ma:internalName="MediaServiceMetadata" ma:readOnly="true">
+      <xsd:simpleType>
+        <xsd:restriction base="dms:Note"/>
+      </xsd:simpleType>
+    </xsd:element>
+    <xsd:element name="MediaServiceFastMetadata" ma:index="9" nillable="true" ma:displayName="MediaServiceFastMetadata" ma:hidden="true" ma:internalName="MediaServiceFastMetadata" ma:readOnly="true">
+      <xsd:simpleType>
+        <xsd:restriction base="dms:Note"/>
+      </xsd:simpleType>
+    </xsd:element>
+    <xsd:element name="MediaServiceAutoKeyPoints" ma:index="10" nillable="true" ma:displayName="MediaServiceAutoKeyPoints" ma:hidden="true" ma:internalName="MediaServiceAutoKeyPoints" ma:readOnly="true">
+      <xsd:simpleType>
+        <xsd:restriction base="dms:Note"/>
+      </xsd:simpleType>
+    </xsd:element>
+    <xsd:element name="MediaServiceKeyPoints" ma:index="11" nillable="true" ma:displayName="KeyPoints" ma:internalName="MediaServiceKeyPoints" ma:readOnly="true">
+      <xsd:simpleType>
+        <xsd:restriction base="dms:Note">
+          <xsd:maxLength value="255"/>
+        </xsd:restriction>
+      </xsd:simpleType>
+    </xsd:element>
+    <xsd:element name="MediaServiceDateTaken" ma:index="12" nillable="true" ma:displayName="MediaServiceDateTaken" ma:hidden="true" ma:internalName="MediaServiceDateTaken" ma:readOnly="true">
+      <xsd:simpleType>
+        <xsd:restriction base="dms:Text"/>
+      </xsd:simpleType>
+    </xsd:element>
+    <xsd:element name="MediaLengthInSeconds" ma:index="13" nillable="true" ma:displayName="MediaLengthInSeconds" ma:hidden="true" ma:internalName="MediaLengthInSeconds" ma:readOnly="true">
+      <xsd:simpleType>
+        <xsd:restriction base="dms:Unknown"/>
+      </xsd:simpleType>
+    </xsd:element>
+    <xsd:element name="MediaServiceGenerationTime" ma:index="15" nillable="true" ma:displayName="MediaServiceGenerationTime" ma:hidden="true" ma:internalName="MediaServiceGenerationTime" ma:readOnly="true">
+      <xsd:simpleType>
+        <xsd:restriction base="dms:Text"/>
+      </xsd:simpleType>
+    </xsd:element>
+    <xsd:element name="MediaServiceEventHashCode" ma:index="16" nillable="true" ma:displayName="MediaServiceEventHashCode" ma:hidden="true" ma:internalName="MediaServiceEventHashCode" ma:readOnly="true">
+      <xsd:simpleType>
+        <xsd:restriction base="dms:Text"/>
+      </xsd:simpleType>
+    </xsd:element>
+    <xsd:element name="lcf76f155ced4ddcb4097134ff3c332f" ma:index="18" nillable="true" ma:taxonomy="true" ma:internalName="lcf76f155ced4ddcb4097134ff3c332f" ma:taxonomyFieldName="MediaServiceImageTags" ma:displayName="Image Tags" ma:readOnly="false" ma:fieldId="{5cf76f15-5ced-4ddc-b409-7134ff3c332f}" ma:taxonomyMulti="true" ma:sspId="8b6fc0cd-01fe-45a4-a6f7-42bcc5426b53" ma:termSetId="09814cd3-568e-fe90-9814-8d621ff8fb84" ma:anchorId="fba54fb3-c3e1-fe81-a776-ca4b69148c4d" ma:open="true" ma:isKeyword="false">
+      <xsd:complexType>
+        <xsd:sequence>
+          <xsd:element ref="pc:Terms" minOccurs="0" maxOccurs="1"/>
+        </xsd:sequence>
+      </xsd:complexType>
+    </xsd:element>
+    <xsd:element name="MediaServiceOCR" ma:index="19" nillable="true" ma:displayName="Extracted Text" ma:internalName="MediaServiceOCR" ma:readOnly="true">
+      <xsd:simpleType>
+        <xsd:restriction base="dms:Note">
+          <xsd:maxLength value="255"/>
+        </xsd:restriction>
+      </xsd:simpleType>
+    </xsd:element>
+    <xsd:element name="MediaServiceLocation" ma:index="20" nillable="true" ma:displayName="Location" ma:internalName="MediaServiceLocation" ma:readOnly="true">
+      <xsd:simpleType>
+        <xsd:restriction base="dms:Text"/>
+      </xsd:simpleType>
+    </xsd:element>
+    <xsd:element name="MediaServiceObjectDetectorVersions" ma:index="23" nillable="true" ma:displayName="MediaServiceObjectDetectorVersions" ma:description="" ma:hidden="true" ma:indexed="true" ma:internalName="MediaServiceObjectDetectorVersions" ma:readOnly="true">
+      <xsd:simpleType>
+        <xsd:restriction base="dms:Text"/>
+      </xsd:simpleType>
+    </xsd:element>
+    <xsd:element name="GillesCallebaut" ma:index="24" nillable="true" ma:displayName="Made By" ma:format="Dropdown" ma:list="UserInfo" ma:SharePointGroup="0" ma:internalName="GillesCallebaut">
+      <xsd:complexType>
+        <xsd:complexContent>
+          <xsd:extension base="dms:User">
+            <xsd:sequence>
+              <xsd:element name="UserInfo" minOccurs="0" maxOccurs="unbounded">
+                <xsd:complexType>
+                  <xsd:sequence>
+                    <xsd:element name="DisplayName" type="xsd:string" minOccurs="0"/>
+                    <xsd:element name="AccountId" type="dms:UserId" minOccurs="0" nillable="true"/>
+                    <xsd:element name="AccountType" type="xsd:string" minOccurs="0"/>
+                  </xsd:sequence>
+                </xsd:complexType>
+              </xsd:element>
+            </xsd:sequence>
+          </xsd:extension>
+        </xsd:complexContent>
+      </xsd:complexType>
+    </xsd:element>
+    <xsd:element name="Topics" ma:index="25" nillable="true" ma:displayName="Topics" ma:format="Dropdown" ma:internalName="Topics">
+      <xsd:complexType>
+        <xsd:complexContent>
+          <xsd:extension base="dms:MultiChoiceFillIn">
+            <xsd:sequence>
+              <xsd:element name="Value" maxOccurs="unbounded" minOccurs="0" nillable="true">
+                <xsd:simpleType>
+                  <xsd:union memberTypes="dms:Text">
+                    <xsd:simpleType>
+                      <xsd:restriction base="dms:Choice">
+                        <xsd:enumeration value="IoT"/>
+                        <xsd:enumeration value="5G and beyond"/>
+                        <xsd:enumeration value="Sustainability"/>
+                        <xsd:enumeration value="WPT"/>
+                        <xsd:enumeration value="Reindeer"/>
+                        <xsd:enumeration value="6GTandem"/>
+                        <xsd:enumeration value="Dramco"/>
+                        <xsd:enumeration value="Presentation"/>
+                        <xsd:enumeration value="Techtile"/>
+                      </xsd:restriction>
+                    </xsd:simpleType>
+                  </xsd:union>
+                </xsd:simpleType>
+              </xsd:element>
+            </xsd:sequence>
+          </xsd:extension>
+        </xsd:complexContent>
+      </xsd:complexType>
+    </xsd:element>
+    <xsd:element name="MediaServiceSearchProperties" ma:index="26" nillable="true" ma:displayName="MediaServiceSearchProperties" ma:hidden="true" ma:internalName="MediaServiceSearchProperties" ma:readOnly="true">
+      <xsd:simpleType>
+        <xsd:restriction base="dms:Note"/>
+      </xsd:simpleType>
+    </xsd:element>
+  </xsd:schema>
+  <xsd:schema xmlns:xsd="http://www.w3.org/2001/XMLSchema" xmlns:xs="http://www.w3.org/2001/XMLSchema" xmlns:dms="http://schemas.microsoft.com/office/2006/documentManagement/types" xmlns:pc="http://schemas.microsoft.com/office/infopath/2007/PartnerControls" targetNamespace="a966ec43-0ce2-440d-85cb-d7baa1361af9" elementFormDefault="qualified">
+    <xsd:import namespace="http://schemas.microsoft.com/office/2006/documentManagement/types"/>
+    <xsd:import namespace="http://schemas.microsoft.com/office/infopath/2007/PartnerControls"/>
+    <xsd:element name="TaxCatchAll" ma:index="14" nillable="true" ma:displayName="Taxonomy Catch All Column" ma:hidden="true" ma:list="{fd383904-99ab-4cb7-8cdb-b1ca560cad21}" ma:internalName="TaxCatchAll" ma:showField="CatchAllData" ma:web="a966ec43-0ce2-440d-85cb-d7baa1361af9">
+      <xsd:complexType>
+        <xsd:complexContent>
+          <xsd:extension base="dms:MultiChoiceLookup">
+            <xsd:sequence>
+              <xsd:element name="Value" type="dms:Lookup" maxOccurs="unbounded" minOccurs="0" nillable="true"/>
+            </xsd:sequence>
+          </xsd:extension>
+        </xsd:complexContent>
+      </xsd:complexType>
+    </xsd:element>
+    <xsd:element name="SharedWithUsers" ma:index="21" nillable="true" ma:displayName="Shared With" ma:internalName="SharedWithUsers" ma:readOnly="true">
+      <xsd:complexType>
+        <xsd:complexContent>
+          <xsd:extension base="dms:UserMulti">
+            <xsd:sequence>
+              <xsd:element name="UserInfo" minOccurs="0" maxOccurs="unbounded">
+                <xsd:complexType>
+                  <xsd:sequence>
+                    <xsd:element name="DisplayName" type="xsd:string" minOccurs="0"/>
+                    <xsd:element name="AccountId" type="dms:UserId" minOccurs="0" nillable="true"/>
+                    <xsd:element name="AccountType" type="xsd:string" minOccurs="0"/>
+                  </xsd:sequence>
+                </xsd:complexType>
+              </xsd:element>
+            </xsd:sequence>
+          </xsd:extension>
+        </xsd:complexContent>
+      </xsd:complexType>
+    </xsd:element>
+    <xsd:element name="SharedWithDetails" ma:index="22" nillable="true" ma:displayName="Shared With Details" ma:internalName="SharedWithDetails" ma:readOnly="true">
+      <xsd:simpleType>
+        <xsd:restriction base="dms:Note">
+          <xsd:maxLength value="255"/>
+        </xsd:restriction>
+      </xsd:simpleType>
+    </xsd:element>
+  </xsd:schema>
+  <xsd:schema xmlns="http://schemas.openxmlformats.org/package/2006/metadata/core-properties" xmlns:xsd="http://www.w3.org/2001/XMLSchema" xmlns:xsi="http://www.w3.org/2001/XMLSchema-instance" xmlns:dc="http://purl.org/dc/elements/1.1/" xmlns:dcterms="http://purl.org/dc/terms/" xmlns:odoc="http://schemas.microsoft.com/internal/obd" targetNamespace="http://schemas.openxmlformats.org/package/2006/metadata/core-properties" elementFormDefault="qualified" attributeFormDefault="unqualified" blockDefault="#all">
+    <xsd:import namespace="http://purl.org/dc/elements/1.1/" schemaLocation="http://dublincore.org/schemas/xmls/qdc/2003/04/02/dc.xsd"/>
+    <xsd:import namespace="http://purl.org/dc/terms/" schemaLocation="http://dublincore.org/schemas/xmls/qdc/2003/04/02/dcterms.xsd"/>
+    <xsd:element name="coreProperties" type="CT_coreProperties"/>
+    <xsd:complexType name="CT_coreProperties">
+      <xsd:all>
+        <xsd:element ref="dc:creator" minOccurs="0" maxOccurs="1"/>
+        <xsd:element ref="dcterms:created" minOccurs="0" maxOccurs="1"/>
+        <xsd:element ref="dc:identifier" minOccurs="0" maxOccurs="1"/>
+        <xsd:element name="contentType" minOccurs="0" maxOccurs="1" type="xsd:string" ma:index="0" ma:displayName="Content Type"/>
+        <xsd:element ref="dc:title" minOccurs="0" maxOccurs="1" ma:index="4" ma:displayName="Title"/>
+        <xsd:element ref="dc:subject" minOccurs="0" maxOccurs="1"/>
+        <xsd:element ref="dc:description" minOccurs="0" maxOccurs="1"/>
+        <xsd:element name="keywords" minOccurs="0" maxOccurs="1" type="xsd:string"/>
+        <xsd:element ref="dc:language" minOccurs="0" maxOccurs="1"/>
+        <xsd:element name="category" minOccurs="0" maxOccurs="1" type="xsd:string"/>
+        <xsd:element name="version" minOccurs="0" maxOccurs="1" type="xsd:string"/>
+        <xsd:element name="revision" minOccurs="0" maxOccurs="1" type="xsd:string">
+          <xsd:annotation>
+            <xsd:documentation>
+                        This value indicates the number of saves or revisions. The application is responsible for updating this value after each revision.
+                    </xsd:documentation>
+          </xsd:annotation>
+        </xsd:element>
+        <xsd:element name="lastModifiedBy" minOccurs="0" maxOccurs="1" type="xsd:string"/>
+        <xsd:element ref="dcterms:modified" minOccurs="0" maxOccurs="1"/>
+        <xsd:element name="contentStatus" minOccurs="0" maxOccurs="1" type="xsd:string"/>
+      </xsd:all>
+    </xsd:complexType>
+  </xsd:schema>
+  <xs:schema xmlns:pc="http://schemas.microsoft.com/office/infopath/2007/PartnerControls" xmlns:xs="http://www.w3.org/2001/XMLSchema" targetNamespace="http://schemas.microsoft.com/office/infopath/2007/PartnerControls" elementFormDefault="qualified" attributeFormDefault="unqualified">
+    <xs:element name="Person">
+      <xs:complexType>
+        <xs:sequence>
+          <xs:element ref="pc:DisplayName" minOccurs="0"/>
+          <xs:element ref="pc:AccountId" minOccurs="0"/>
+          <xs:element ref="pc:AccountType" minOccurs="0"/>
+        </xs:sequence>
+      </xs:complexType>
+    </xs:element>
+    <xs:element name="DisplayName" type="xs:string"/>
+    <xs:element name="AccountId" type="xs:string"/>
+    <xs:element name="AccountType" type="xs:string"/>
+    <xs:element name="BDCAssociatedEntity">
+      <xs:complexType>
+        <xs:sequence>
+          <xs:element ref="pc:BDCEntity" minOccurs="0" maxOccurs="unbounded"/>
+        </xs:sequence>
+        <xs:attribute ref="pc:EntityNamespace"/>
+        <xs:attribute ref="pc:EntityName"/>
+        <xs:attribute ref="pc:SystemInstanceName"/>
+        <xs:attribute ref="pc:AssociationName"/>
+      </xs:complexType>
+    </xs:element>
+    <xs:attribute name="EntityNamespace" type="xs:string"/>
+    <xs:attribute name="EntityName" type="xs:string"/>
+    <xs:attribute name="SystemInstanceName" type="xs:string"/>
+    <xs:attribute name="AssociationName" type="xs:string"/>
+    <xs:element name="BDCEntity">
+      <xs:complexType>
+        <xs:sequence>
+          <xs:element ref="pc:EntityDisplayName" minOccurs="0"/>
+          <xs:element ref="pc:EntityInstanceReference" minOccurs="0"/>
+          <xs:element ref="pc:EntityId1" minOccurs="0"/>
+          <xs:element ref="pc:EntityId2" minOccurs="0"/>
+          <xs:element ref="pc:EntityId3" minOccurs="0"/>
+          <xs:element ref="pc:EntityId4" minOccurs="0"/>
+          <xs:element ref="pc:EntityId5" minOccurs="0"/>
+        </xs:sequence>
+      </xs:complexType>
+    </xs:element>
+    <xs:element name="EntityDisplayName" type="xs:string"/>
+    <xs:element name="EntityInstanceReference" type="xs:string"/>
+    <xs:element name="EntityId1" type="xs:string"/>
+    <xs:element name="EntityId2" type="xs:string"/>
+    <xs:element name="EntityId3" type="xs:string"/>
+    <xs:element name="EntityId4" type="xs:string"/>
+    <xs:element name="EntityId5" type="xs:string"/>
+    <xs:element name="Terms">
+      <xs:complexType>
+        <xs:sequence>
+          <xs:element ref="pc:TermInfo" minOccurs="0" maxOccurs="unbounded"/>
+        </xs:sequence>
+      </xs:complexType>
+    </xs:element>
+    <xs:element name="TermInfo">
+      <xs:complexType>
+        <xs:sequence>
+          <xs:element ref="pc:TermName" minOccurs="0"/>
+          <xs:element ref="pc:TermId" minOccurs="0"/>
+        </xs:sequence>
+      </xs:complexType>
+    </xs:element>
+    <xs:element name="TermName" type="xs:string"/>
+    <xs:element name="TermId" type="xs:string"/>
+  </xs:schema>
+</ct:contentTypeSchema>
+</file>
+
+<file path=customXml/item2.xml><?xml version="1.0" encoding="utf-8"?>
+<?mso-contentType ?>
+<FormTemplates xmlns="http://schemas.microsoft.com/sharepoint/v3/contenttype/forms">
+  <Display>DocumentLibraryForm</Display>
+  <Edit>DocumentLibraryForm</Edit>
+  <New>DocumentLibraryForm</New>
+</FormTemplates>
+</file>
+
+<file path=customXml/itemProps1.xml><?xml version="1.0" encoding="utf-8"?>
+<ds:datastoreItem xmlns:ds="http://schemas.openxmlformats.org/officeDocument/2006/customXml" ds:itemID="{0DC7A721-7ADC-40A2-8180-84BC84AE20C5}">
+  <ds:schemaRefs>
+    <ds:schemaRef ds:uri="http://schemas.microsoft.com/office/2006/metadata/contentType"/>
+    <ds:schemaRef ds:uri="http://schemas.microsoft.com/office/2006/metadata/properties/metaAttributes"/>
+    <ds:schemaRef ds:uri="http://www.w3.org/2001/XMLSchema"/>
+    <ds:schemaRef ds:uri="http://schemas.microsoft.com/office/2006/metadata/properties"/>
+    <ds:schemaRef ds:uri="c632d63d-d94d-44a4-8cd4-d414f261ccd2"/>
+    <ds:schemaRef ds:uri="a966ec43-0ce2-440d-85cb-d7baa1361af9"/>
+    <ds:schemaRef ds:uri="http://schemas.microsoft.com/office/2006/documentManagement/types"/>
+    <ds:schemaRef ds:uri="http://schemas.microsoft.com/office/infopath/2007/PartnerControls"/>
+    <ds:schemaRef ds:uri="http://schemas.openxmlformats.org/package/2006/metadata/core-properties"/>
+    <ds:schemaRef ds:uri="http://purl.org/dc/elements/1.1/"/>
+    <ds:schemaRef ds:uri="http://purl.org/dc/terms/"/>
+    <ds:schemaRef ds:uri="http://schemas.microsoft.com/internal/obd"/>
+  </ds:schemaRefs>
+</ds:datastoreItem>
+</file>
+
+<file path=customXml/itemProps2.xml><?xml version="1.0" encoding="utf-8"?>
+<ds:datastoreItem xmlns:ds="http://schemas.openxmlformats.org/officeDocument/2006/customXml" ds:itemID="{5E126FBA-03B4-44EF-862F-8432DE9E7715}">
+  <ds:schemaRefs>
+    <ds:schemaRef ds:uri="http://schemas.microsoft.com/sharepoint/v3/contenttype/forms"/>
+  </ds:schemaRefs>
+</ds:datastoreItem>
 </file>
</xml_diff>